<commit_message>
suggested modifications in the presentation
</commit_message>
<xml_diff>
--- a/01_Intro_Slides_SummerSchool_Sep21.pptx
+++ b/01_Intro_Slides_SummerSchool_Sep21.pptx
@@ -10,10 +10,10 @@
     <p:sldMasterId id="2147483697" r:id="rId6"/>
   </p:sldMasterIdLst>
   <p:notesMasterIdLst>
-    <p:notesMasterId r:id="rId28"/>
+    <p:notesMasterId r:id="rId29"/>
   </p:notesMasterIdLst>
   <p:handoutMasterIdLst>
-    <p:handoutMasterId r:id="rId29"/>
+    <p:handoutMasterId r:id="rId30"/>
   </p:handoutMasterIdLst>
   <p:sldIdLst>
     <p:sldId id="356" r:id="rId7"/>
@@ -36,7 +36,8 @@
     <p:sldId id="425" r:id="rId24"/>
     <p:sldId id="426" r:id="rId25"/>
     <p:sldId id="407" r:id="rId26"/>
-    <p:sldId id="404" r:id="rId27"/>
+    <p:sldId id="427" r:id="rId27"/>
+    <p:sldId id="404" r:id="rId28"/>
   </p:sldIdLst>
   <p:sldSz cx="9144000" cy="6858000" type="screen4x3"/>
   <p:notesSz cx="9925050" cy="6665913"/>
@@ -7199,7 +7200,7 @@
             <a:rPr lang="de-DE" sz="2400" b="1" dirty="0" err="1" smtClean="0">
               <a:latin typeface="Arial monospaced for SAP" panose="020B0609020202030204" pitchFamily="49" charset="0"/>
             </a:rPr>
-            <a:t>MLomix</a:t>
+            <a:t>DLOmix</a:t>
           </a:r>
           <a:endParaRPr lang="de-DE" sz="1200" b="1" dirty="0">
             <a:latin typeface="Arial monospaced for SAP" panose="020B0609020202030204" pitchFamily="49" charset="0"/>
@@ -8089,7 +8090,7 @@
             <a:rPr lang="de-DE" sz="2400" b="1" dirty="0" err="1" smtClean="0">
               <a:latin typeface="Arial monospaced for SAP" panose="020B0609020202030204" pitchFamily="49" charset="0"/>
             </a:rPr>
-            <a:t>MLomix</a:t>
+            <a:t>DLOmix</a:t>
           </a:r>
           <a:endParaRPr lang="de-DE" sz="1200" b="1" dirty="0">
             <a:latin typeface="Arial monospaced for SAP" panose="020B0609020202030204" pitchFamily="49" charset="0"/>
@@ -8979,7 +8980,7 @@
             <a:rPr lang="de-DE" sz="2400" b="1" dirty="0" err="1" smtClean="0">
               <a:latin typeface="Arial monospaced for SAP" panose="020B0609020202030204" pitchFamily="49" charset="0"/>
             </a:rPr>
-            <a:t>MLomix</a:t>
+            <a:t>DLOmix</a:t>
           </a:r>
           <a:endParaRPr lang="de-DE" sz="1200" b="1" dirty="0">
             <a:latin typeface="Arial monospaced for SAP" panose="020B0609020202030204" pitchFamily="49" charset="0"/>
@@ -12058,7 +12059,7 @@
             <a:rPr lang="de-DE" sz="2400" b="1" kern="1200" dirty="0" err="1" smtClean="0">
               <a:latin typeface="Arial monospaced for SAP" panose="020B0609020202030204" pitchFamily="49" charset="0"/>
             </a:rPr>
-            <a:t>MLomix</a:t>
+            <a:t>DLOmix</a:t>
           </a:r>
           <a:endParaRPr lang="de-DE" sz="1200" b="1" kern="1200" dirty="0">
             <a:latin typeface="Arial monospaced for SAP" panose="020B0609020202030204" pitchFamily="49" charset="0"/>
@@ -12754,7 +12755,7 @@
       <dsp:spPr>
         <a:xfrm>
           <a:off x="1128952" y="0"/>
-          <a:ext cx="5450510" cy="1009040"/>
+          <a:ext cx="5450510" cy="916579"/>
         </a:xfrm>
         <a:prstGeom prst="roundRect">
           <a:avLst>
@@ -12817,7 +12818,7 @@
             <a:rPr lang="de-DE" sz="2400" b="1" kern="1200" dirty="0" err="1" smtClean="0">
               <a:latin typeface="Arial monospaced for SAP" panose="020B0609020202030204" pitchFamily="49" charset="0"/>
             </a:rPr>
-            <a:t>MLomix</a:t>
+            <a:t>DLOmix</a:t>
           </a:r>
           <a:endParaRPr lang="de-DE" sz="1200" b="1" kern="1200" dirty="0">
             <a:latin typeface="Arial monospaced for SAP" panose="020B0609020202030204" pitchFamily="49" charset="0"/>
@@ -12825,8 +12826,8 @@
         </a:p>
       </dsp:txBody>
       <dsp:txXfrm>
-        <a:off x="1158506" y="29554"/>
-        <a:ext cx="5391402" cy="949932"/>
+        <a:off x="1155798" y="26846"/>
+        <a:ext cx="5396818" cy="862887"/>
       </dsp:txXfrm>
     </dsp:sp>
     <dsp:sp modelId="{E5992A07-26E4-4819-860A-49810989A2A2}">
@@ -12836,8 +12837,8 @@
       </dsp:nvSpPr>
       <dsp:spPr>
         <a:xfrm>
-          <a:off x="2091" y="1217694"/>
-          <a:ext cx="1078554" cy="1009040"/>
+          <a:off x="2091" y="1123564"/>
+          <a:ext cx="1078554" cy="916579"/>
         </a:xfrm>
         <a:prstGeom prst="roundRect">
           <a:avLst>
@@ -12908,8 +12909,8 @@
         </a:p>
       </dsp:txBody>
       <dsp:txXfrm>
-        <a:off x="31645" y="1247248"/>
-        <a:ext cx="1019446" cy="949932"/>
+        <a:off x="28937" y="1150410"/>
+        <a:ext cx="1024862" cy="862887"/>
       </dsp:txXfrm>
     </dsp:sp>
     <dsp:sp modelId="{2C9F7DE9-8967-4E67-AF88-B5944B425068}">
@@ -12919,8 +12920,8 @@
       </dsp:nvSpPr>
       <dsp:spPr>
         <a:xfrm>
-          <a:off x="1156994" y="1217694"/>
-          <a:ext cx="908914" cy="1009040"/>
+          <a:off x="1156994" y="1123564"/>
+          <a:ext cx="908914" cy="916579"/>
         </a:xfrm>
         <a:prstGeom prst="roundRect">
           <a:avLst>
@@ -12991,8 +12992,8 @@
         </a:p>
       </dsp:txBody>
       <dsp:txXfrm>
-        <a:off x="1183615" y="1244315"/>
-        <a:ext cx="855672" cy="955798"/>
+        <a:off x="1183615" y="1150185"/>
+        <a:ext cx="855672" cy="863337"/>
       </dsp:txXfrm>
     </dsp:sp>
     <dsp:sp modelId="{FC021332-E035-4C7B-BDF2-8E4FCA1A9380}">
@@ -13002,8 +13003,8 @@
       </dsp:nvSpPr>
       <dsp:spPr>
         <a:xfrm>
-          <a:off x="2142257" y="1217694"/>
-          <a:ext cx="908914" cy="1009040"/>
+          <a:off x="2142257" y="1123564"/>
+          <a:ext cx="908914" cy="916579"/>
         </a:xfrm>
         <a:prstGeom prst="roundRect">
           <a:avLst>
@@ -13074,8 +13075,8 @@
         </a:p>
       </dsp:txBody>
       <dsp:txXfrm>
-        <a:off x="2168878" y="1244315"/>
-        <a:ext cx="855672" cy="955798"/>
+        <a:off x="2168878" y="1150185"/>
+        <a:ext cx="855672" cy="863337"/>
       </dsp:txXfrm>
     </dsp:sp>
     <dsp:sp modelId="{099B7531-33CC-4255-9EF9-0181C377F7EB}">
@@ -13085,8 +13086,8 @@
       </dsp:nvSpPr>
       <dsp:spPr>
         <a:xfrm>
-          <a:off x="3127520" y="1217694"/>
-          <a:ext cx="908914" cy="1009040"/>
+          <a:off x="3127520" y="1123564"/>
+          <a:ext cx="908914" cy="916579"/>
         </a:xfrm>
         <a:prstGeom prst="roundRect">
           <a:avLst>
@@ -13157,8 +13158,8 @@
         </a:p>
       </dsp:txBody>
       <dsp:txXfrm>
-        <a:off x="3154141" y="1244315"/>
-        <a:ext cx="855672" cy="955798"/>
+        <a:off x="3154141" y="1150185"/>
+        <a:ext cx="855672" cy="863337"/>
       </dsp:txXfrm>
     </dsp:sp>
     <dsp:sp modelId="{8A6199F2-F1DB-4146-970C-9EBFF04B7FED}">
@@ -13168,8 +13169,8 @@
       </dsp:nvSpPr>
       <dsp:spPr>
         <a:xfrm>
-          <a:off x="4112783" y="1217694"/>
-          <a:ext cx="908914" cy="1009040"/>
+          <a:off x="4112783" y="1123564"/>
+          <a:ext cx="908914" cy="916579"/>
         </a:xfrm>
         <a:prstGeom prst="roundRect">
           <a:avLst>
@@ -13240,8 +13241,8 @@
         </a:p>
       </dsp:txBody>
       <dsp:txXfrm>
-        <a:off x="4139404" y="1244315"/>
-        <a:ext cx="855672" cy="955798"/>
+        <a:off x="4139404" y="1150185"/>
+        <a:ext cx="855672" cy="863337"/>
       </dsp:txXfrm>
     </dsp:sp>
     <dsp:sp modelId="{8498E32E-2AD0-4451-86A6-4DC2D6F7D6A0}">
@@ -13251,8 +13252,8 @@
       </dsp:nvSpPr>
       <dsp:spPr>
         <a:xfrm>
-          <a:off x="5098046" y="1217694"/>
-          <a:ext cx="1022019" cy="1009040"/>
+          <a:off x="5098046" y="1123564"/>
+          <a:ext cx="1022019" cy="916579"/>
         </a:xfrm>
         <a:prstGeom prst="roundRect">
           <a:avLst>
@@ -13323,8 +13324,8 @@
         </a:p>
       </dsp:txBody>
       <dsp:txXfrm>
-        <a:off x="5127600" y="1247248"/>
-        <a:ext cx="962911" cy="949932"/>
+        <a:off x="5124892" y="1150410"/>
+        <a:ext cx="968327" cy="862887"/>
       </dsp:txXfrm>
     </dsp:sp>
     <dsp:sp modelId="{D818B6D9-FAA2-496D-B78C-22D2B03C2AFB}">
@@ -13334,8 +13335,8 @@
       </dsp:nvSpPr>
       <dsp:spPr>
         <a:xfrm>
-          <a:off x="6196415" y="1217694"/>
-          <a:ext cx="1034580" cy="1009040"/>
+          <a:off x="6196415" y="1123564"/>
+          <a:ext cx="1034580" cy="916579"/>
         </a:xfrm>
         <a:prstGeom prst="roundRect">
           <a:avLst>
@@ -13406,8 +13407,8 @@
         </a:p>
       </dsp:txBody>
       <dsp:txXfrm>
-        <a:off x="6225969" y="1247248"/>
-        <a:ext cx="975472" cy="949932"/>
+        <a:off x="6223261" y="1150410"/>
+        <a:ext cx="980888" cy="862887"/>
       </dsp:txXfrm>
     </dsp:sp>
     <dsp:sp modelId="{3B3A6269-3535-42DF-BA97-F99FE5A6A445}">
@@ -13417,8 +13418,8 @@
       </dsp:nvSpPr>
       <dsp:spPr>
         <a:xfrm>
-          <a:off x="7307345" y="1217694"/>
-          <a:ext cx="908914" cy="1009040"/>
+          <a:off x="7307345" y="1123564"/>
+          <a:ext cx="908914" cy="916579"/>
         </a:xfrm>
         <a:prstGeom prst="roundRect">
           <a:avLst>
@@ -13489,8 +13490,8 @@
         </a:p>
       </dsp:txBody>
       <dsp:txXfrm>
-        <a:off x="7333966" y="1244315"/>
-        <a:ext cx="855672" cy="955798"/>
+        <a:off x="7333966" y="1150185"/>
+        <a:ext cx="855672" cy="863337"/>
       </dsp:txXfrm>
     </dsp:sp>
   </dsp:spTree>
@@ -13513,7 +13514,7 @@
       <dsp:spPr>
         <a:xfrm>
           <a:off x="1128952" y="0"/>
-          <a:ext cx="5450510" cy="1009040"/>
+          <a:ext cx="5450510" cy="923661"/>
         </a:xfrm>
         <a:prstGeom prst="roundRect">
           <a:avLst>
@@ -13576,7 +13577,7 @@
             <a:rPr lang="de-DE" sz="2400" b="1" kern="1200" dirty="0" err="1" smtClean="0">
               <a:latin typeface="Arial monospaced for SAP" panose="020B0609020202030204" pitchFamily="49" charset="0"/>
             </a:rPr>
-            <a:t>MLomix</a:t>
+            <a:t>DLOmix</a:t>
           </a:r>
           <a:endParaRPr lang="de-DE" sz="1200" b="1" kern="1200" dirty="0">
             <a:latin typeface="Arial monospaced for SAP" panose="020B0609020202030204" pitchFamily="49" charset="0"/>
@@ -13584,8 +13585,8 @@
         </a:p>
       </dsp:txBody>
       <dsp:txXfrm>
-        <a:off x="1158506" y="29554"/>
-        <a:ext cx="5391402" cy="949932"/>
+        <a:off x="1156005" y="27053"/>
+        <a:ext cx="5396404" cy="869555"/>
       </dsp:txXfrm>
     </dsp:sp>
     <dsp:sp modelId="{E5992A07-26E4-4819-860A-49810989A2A2}">
@@ -13595,8 +13596,8 @@
       </dsp:nvSpPr>
       <dsp:spPr>
         <a:xfrm>
-          <a:off x="2091" y="1217694"/>
-          <a:ext cx="1078554" cy="1009040"/>
+          <a:off x="2091" y="1131446"/>
+          <a:ext cx="1078554" cy="923661"/>
         </a:xfrm>
         <a:prstGeom prst="roundRect">
           <a:avLst>
@@ -13667,8 +13668,8 @@
         </a:p>
       </dsp:txBody>
       <dsp:txXfrm>
-        <a:off x="31645" y="1247248"/>
-        <a:ext cx="1019446" cy="949932"/>
+        <a:off x="29144" y="1158499"/>
+        <a:ext cx="1024448" cy="869555"/>
       </dsp:txXfrm>
     </dsp:sp>
     <dsp:sp modelId="{2C9F7DE9-8967-4E67-AF88-B5944B425068}">
@@ -13678,8 +13679,8 @@
       </dsp:nvSpPr>
       <dsp:spPr>
         <a:xfrm>
-          <a:off x="1156994" y="1217694"/>
-          <a:ext cx="908914" cy="1009040"/>
+          <a:off x="1156994" y="1131446"/>
+          <a:ext cx="908914" cy="923661"/>
         </a:xfrm>
         <a:prstGeom prst="roundRect">
           <a:avLst>
@@ -13750,8 +13751,8 @@
         </a:p>
       </dsp:txBody>
       <dsp:txXfrm>
-        <a:off x="1183615" y="1244315"/>
-        <a:ext cx="855672" cy="955798"/>
+        <a:off x="1183615" y="1158067"/>
+        <a:ext cx="855672" cy="870419"/>
       </dsp:txXfrm>
     </dsp:sp>
     <dsp:sp modelId="{FC021332-E035-4C7B-BDF2-8E4FCA1A9380}">
@@ -13761,8 +13762,8 @@
       </dsp:nvSpPr>
       <dsp:spPr>
         <a:xfrm>
-          <a:off x="2142257" y="1217694"/>
-          <a:ext cx="908914" cy="1009040"/>
+          <a:off x="2142257" y="1131446"/>
+          <a:ext cx="908914" cy="923661"/>
         </a:xfrm>
         <a:prstGeom prst="roundRect">
           <a:avLst>
@@ -13833,8 +13834,8 @@
         </a:p>
       </dsp:txBody>
       <dsp:txXfrm>
-        <a:off x="2168878" y="1244315"/>
-        <a:ext cx="855672" cy="955798"/>
+        <a:off x="2168878" y="1158067"/>
+        <a:ext cx="855672" cy="870419"/>
       </dsp:txXfrm>
     </dsp:sp>
     <dsp:sp modelId="{099B7531-33CC-4255-9EF9-0181C377F7EB}">
@@ -13844,8 +13845,8 @@
       </dsp:nvSpPr>
       <dsp:spPr>
         <a:xfrm>
-          <a:off x="3127520" y="1217694"/>
-          <a:ext cx="908914" cy="1009040"/>
+          <a:off x="3127520" y="1131446"/>
+          <a:ext cx="908914" cy="923661"/>
         </a:xfrm>
         <a:prstGeom prst="roundRect">
           <a:avLst>
@@ -13916,8 +13917,8 @@
         </a:p>
       </dsp:txBody>
       <dsp:txXfrm>
-        <a:off x="3154141" y="1244315"/>
-        <a:ext cx="855672" cy="955798"/>
+        <a:off x="3154141" y="1158067"/>
+        <a:ext cx="855672" cy="870419"/>
       </dsp:txXfrm>
     </dsp:sp>
     <dsp:sp modelId="{8A6199F2-F1DB-4146-970C-9EBFF04B7FED}">
@@ -13927,8 +13928,8 @@
       </dsp:nvSpPr>
       <dsp:spPr>
         <a:xfrm>
-          <a:off x="4112783" y="1217694"/>
-          <a:ext cx="908914" cy="1009040"/>
+          <a:off x="4112783" y="1131446"/>
+          <a:ext cx="908914" cy="923661"/>
         </a:xfrm>
         <a:prstGeom prst="roundRect">
           <a:avLst>
@@ -13999,8 +14000,8 @@
         </a:p>
       </dsp:txBody>
       <dsp:txXfrm>
-        <a:off x="4139404" y="1244315"/>
-        <a:ext cx="855672" cy="955798"/>
+        <a:off x="4139404" y="1158067"/>
+        <a:ext cx="855672" cy="870419"/>
       </dsp:txXfrm>
     </dsp:sp>
     <dsp:sp modelId="{8498E32E-2AD0-4451-86A6-4DC2D6F7D6A0}">
@@ -14010,8 +14011,8 @@
       </dsp:nvSpPr>
       <dsp:spPr>
         <a:xfrm>
-          <a:off x="5098046" y="1217694"/>
-          <a:ext cx="1022019" cy="1009040"/>
+          <a:off x="5098046" y="1131446"/>
+          <a:ext cx="1022019" cy="923661"/>
         </a:xfrm>
         <a:prstGeom prst="roundRect">
           <a:avLst>
@@ -14082,8 +14083,8 @@
         </a:p>
       </dsp:txBody>
       <dsp:txXfrm>
-        <a:off x="5127600" y="1247248"/>
-        <a:ext cx="962911" cy="949932"/>
+        <a:off x="5125099" y="1158499"/>
+        <a:ext cx="967913" cy="869555"/>
       </dsp:txXfrm>
     </dsp:sp>
     <dsp:sp modelId="{D818B6D9-FAA2-496D-B78C-22D2B03C2AFB}">
@@ -14093,8 +14094,8 @@
       </dsp:nvSpPr>
       <dsp:spPr>
         <a:xfrm>
-          <a:off x="6196415" y="1217694"/>
-          <a:ext cx="1034580" cy="1009040"/>
+          <a:off x="6196415" y="1131446"/>
+          <a:ext cx="1034580" cy="923661"/>
         </a:xfrm>
         <a:prstGeom prst="roundRect">
           <a:avLst>
@@ -14165,8 +14166,8 @@
         </a:p>
       </dsp:txBody>
       <dsp:txXfrm>
-        <a:off x="6225969" y="1247248"/>
-        <a:ext cx="975472" cy="949932"/>
+        <a:off x="6223468" y="1158499"/>
+        <a:ext cx="980474" cy="869555"/>
       </dsp:txXfrm>
     </dsp:sp>
     <dsp:sp modelId="{3B3A6269-3535-42DF-BA97-F99FE5A6A445}">
@@ -14176,8 +14177,8 @@
       </dsp:nvSpPr>
       <dsp:spPr>
         <a:xfrm>
-          <a:off x="7307345" y="1217694"/>
-          <a:ext cx="908914" cy="1009040"/>
+          <a:off x="7307345" y="1131446"/>
+          <a:ext cx="908914" cy="923661"/>
         </a:xfrm>
         <a:prstGeom prst="roundRect">
           <a:avLst>
@@ -14248,8 +14249,8 @@
         </a:p>
       </dsp:txBody>
       <dsp:txXfrm>
-        <a:off x="7333966" y="1244315"/>
-        <a:ext cx="855672" cy="955798"/>
+        <a:off x="7333966" y="1158067"/>
+        <a:ext cx="855672" cy="870419"/>
       </dsp:txXfrm>
     </dsp:sp>
   </dsp:spTree>
@@ -23471,7 +23472,7 @@
               <a:pPr>
                 <a:defRPr/>
               </a:pPr>
-              <a:t>14/09/2021</a:t>
+              <a:t>15/09/2021</a:t>
             </a:fld>
             <a:endParaRPr lang="en-GB" dirty="0"/>
           </a:p>
@@ -23690,7 +23691,7 @@
               <a:pPr>
                 <a:defRPr/>
               </a:pPr>
-              <a:t>14/09/2021</a:t>
+              <a:t>15/09/2021</a:t>
             </a:fld>
             <a:endParaRPr lang="en-GB"/>
           </a:p>
@@ -24070,8 +24071,28 @@
         </p:nvSpPr>
         <p:spPr/>
         <p:txBody>
-          <a:bodyPr/>
+          <a:bodyPr>
+            <a:normAutofit fontScale="92500" lnSpcReduction="10000"/>
+          </a:bodyPr>
           <a:lstStyle/>
+          <a:p>
+            <a:endParaRPr lang="en-US" dirty="0" smtClean="0"/>
+          </a:p>
+          <a:p>
+            <a:r>
+              <a:rPr lang="en-US" dirty="0" smtClean="0"/>
+              <a:t>slide asking for feedback at the end of the slide</a:t>
+            </a:r>
+          </a:p>
+          <a:p>
+            <a:endParaRPr lang="en-US" dirty="0" smtClean="0"/>
+          </a:p>
+          <a:p>
+            <a:endParaRPr lang="en-US" dirty="0" smtClean="0"/>
+          </a:p>
+          <a:p>
+            <a:endParaRPr lang="en-US" dirty="0" smtClean="0"/>
+          </a:p>
           <a:p>
             <a:endParaRPr lang="en-US" dirty="0"/>
           </a:p>
@@ -34182,11 +34203,7 @@
           <a:p>
             <a:r>
               <a:rPr lang="en-US" sz="1500" b="1" dirty="0" smtClean="0"/>
-              <a:t>Prof. Dr. Mathias </a:t>
-            </a:r>
-            <a:r>
-              <a:rPr lang="en-US" sz="1500" b="1" dirty="0" smtClean="0"/>
-              <a:t>Wilhelm</a:t>
+              <a:t>Prof. Dr. Mathias Wilhelm</a:t>
             </a:r>
             <a:endParaRPr lang="en-US" sz="1500" dirty="0" smtClean="0"/>
           </a:p>
@@ -34448,12 +34465,16 @@
             <a:graphicFrameLocks/>
           </p:cNvGraphicFramePr>
           <p:nvPr>
-            <p:extLst/>
+            <p:extLst>
+              <p:ext uri="{D42A27DB-BD31-4B8C-83A1-F6EECF244321}">
+                <p14:modId xmlns:p14="http://schemas.microsoft.com/office/powerpoint/2010/main" val="1017020530"/>
+              </p:ext>
+            </p:extLst>
           </p:nvPr>
         </p:nvGraphicFramePr>
         <p:xfrm>
-          <a:off x="530236" y="2351785"/>
-          <a:ext cx="8218351" cy="2226849"/>
+          <a:off x="530236" y="2522483"/>
+          <a:ext cx="8218351" cy="2056151"/>
         </p:xfrm>
         <a:graphic>
           <a:graphicData uri="http://schemas.openxmlformats.org/drawingml/2006/diagram">
@@ -34789,7 +34810,15 @@
             </a:pPr>
             <a:r>
               <a:rPr lang="en-US" sz="2200" dirty="0" smtClean="0"/>
-              <a:t>Output: predicted index retention time</a:t>
+              <a:t>Output: predicted </a:t>
+            </a:r>
+            <a:r>
+              <a:rPr lang="en-US" sz="2200" dirty="0" smtClean="0"/>
+              <a:t>indexed </a:t>
+            </a:r>
+            <a:r>
+              <a:rPr lang="en-US" sz="2200" dirty="0" smtClean="0"/>
+              <a:t>retention time</a:t>
             </a:r>
           </a:p>
           <a:p>
@@ -34822,7 +34851,7 @@
             </a:r>
             <a:r>
               <a:rPr lang="en-US" sz="2200" dirty="0" smtClean="0"/>
-              <a:t> et al. (2019), a common architecture for retention time prediction </a:t>
+              <a:t> et al. (2019), a deep learning architecture for retention time prediction </a:t>
             </a:r>
             <a:endParaRPr lang="en-US" sz="2200" dirty="0"/>
           </a:p>
@@ -37001,11 +37030,11 @@
               <a:t>, </a:t>
             </a:r>
             <a:r>
-              <a:rPr lang="en-US" sz="1800" dirty="0" err="1"/>
+              <a:rPr lang="en-US" sz="1800" dirty="0" err="1" smtClean="0"/>
               <a:t>mse</a:t>
             </a:r>
             <a:r>
-              <a:rPr lang="en-US" sz="1800" dirty="0"/>
+              <a:rPr lang="en-US" sz="1800" dirty="0" smtClean="0"/>
               <a:t>, </a:t>
             </a:r>
             <a:r>
@@ -37969,6 +37998,214 @@
           <a:bodyPr/>
           <a:lstStyle/>
           <a:p>
+            <a:pPr marL="285750" indent="-285750">
+              <a:lnSpc>
+                <a:spcPct val="150000"/>
+              </a:lnSpc>
+              <a:buFont typeface="Arial" panose="020B0604020202020204" pitchFamily="34" charset="0"/>
+              <a:buChar char="•"/>
+            </a:pPr>
+            <a:r>
+              <a:rPr lang="en-US" sz="2400" dirty="0" smtClean="0"/>
+              <a:t>At this stage, we definitely appreciate your feedback:</a:t>
+            </a:r>
+          </a:p>
+          <a:p>
+            <a:pPr marL="519113" lvl="1" indent="-342900">
+              <a:lnSpc>
+                <a:spcPct val="150000"/>
+              </a:lnSpc>
+              <a:buFont typeface="Courier New" panose="02070309020205020404" pitchFamily="49" charset="0"/>
+              <a:buChar char="o"/>
+            </a:pPr>
+            <a:r>
+              <a:rPr lang="en-US" sz="2400" dirty="0" smtClean="0"/>
+              <a:t>the sessions</a:t>
+            </a:r>
+          </a:p>
+          <a:p>
+            <a:pPr marL="519113" lvl="1" indent="-342900">
+              <a:lnSpc>
+                <a:spcPct val="150000"/>
+              </a:lnSpc>
+              <a:buFont typeface="Courier New" panose="02070309020205020404" pitchFamily="49" charset="0"/>
+              <a:buChar char="o"/>
+            </a:pPr>
+            <a:r>
+              <a:rPr lang="en-US" sz="2400" dirty="0" smtClean="0"/>
+              <a:t>The current API and modules</a:t>
+            </a:r>
+          </a:p>
+          <a:p>
+            <a:pPr marL="519113" lvl="1" indent="-342900">
+              <a:lnSpc>
+                <a:spcPct val="150000"/>
+              </a:lnSpc>
+              <a:buFont typeface="Courier New" panose="02070309020205020404" pitchFamily="49" charset="0"/>
+              <a:buChar char="o"/>
+            </a:pPr>
+            <a:r>
+              <a:rPr lang="en-US" sz="2400" dirty="0" smtClean="0"/>
+              <a:t>What is good</a:t>
+            </a:r>
+          </a:p>
+          <a:p>
+            <a:pPr marL="519113" lvl="1" indent="-342900">
+              <a:lnSpc>
+                <a:spcPct val="150000"/>
+              </a:lnSpc>
+              <a:buFont typeface="Courier New" panose="02070309020205020404" pitchFamily="49" charset="0"/>
+              <a:buChar char="o"/>
+            </a:pPr>
+            <a:r>
+              <a:rPr lang="en-US" sz="2400" dirty="0" smtClean="0"/>
+              <a:t>What can be improved</a:t>
+            </a:r>
+          </a:p>
+          <a:p>
+            <a:pPr marL="519113" lvl="1" indent="-342900">
+              <a:lnSpc>
+                <a:spcPct val="150000"/>
+              </a:lnSpc>
+              <a:buFont typeface="Courier New" panose="02070309020205020404" pitchFamily="49" charset="0"/>
+              <a:buChar char="o"/>
+            </a:pPr>
+            <a:endParaRPr lang="en-US" sz="2400" dirty="0" smtClean="0"/>
+          </a:p>
+          <a:p>
+            <a:pPr marL="285750" indent="-285750">
+              <a:lnSpc>
+                <a:spcPct val="150000"/>
+              </a:lnSpc>
+              <a:buFont typeface="Arial" panose="020B0604020202020204" pitchFamily="34" charset="0"/>
+              <a:buChar char="•"/>
+            </a:pPr>
+            <a:endParaRPr lang="en-US" sz="2400" dirty="0"/>
+          </a:p>
+        </p:txBody>
+      </p:sp>
+      <p:sp>
+        <p:nvSpPr>
+          <p:cNvPr id="3" name="Foliennummernplatzhalter 2"/>
+          <p:cNvSpPr>
+            <a:spLocks noGrp="1"/>
+          </p:cNvSpPr>
+          <p:nvPr>
+            <p:ph type="sldNum" sz="quarter" idx="11"/>
+          </p:nvPr>
+        </p:nvSpPr>
+        <p:spPr/>
+        <p:txBody>
+          <a:bodyPr/>
+          <a:lstStyle/>
+          <a:p>
+            <a:fld id="{CE58CB1E-F828-4F11-99E0-327109AF9DA4}" type="slidenum">
+              <a:rPr lang="de-DE" smtClean="0"/>
+              <a:pPr/>
+              <a:t>21</a:t>
+            </a:fld>
+            <a:endParaRPr lang="de-DE" dirty="0"/>
+          </a:p>
+        </p:txBody>
+      </p:sp>
+      <p:sp>
+        <p:nvSpPr>
+          <p:cNvPr id="4" name="Fußzeilenplatzhalter 3"/>
+          <p:cNvSpPr>
+            <a:spLocks noGrp="1"/>
+          </p:cNvSpPr>
+          <p:nvPr>
+            <p:ph type="ftr" sz="quarter" idx="12"/>
+          </p:nvPr>
+        </p:nvSpPr>
+        <p:spPr/>
+        <p:txBody>
+          <a:bodyPr/>
+          <a:lstStyle/>
+          <a:p>
+            <a:r>
+              <a:rPr lang="en-US" smtClean="0"/>
+              <a:t>Prof. Dr. Mathias Wilhelm (TUM) | Wilhelm Group | Computational Mass Spectrometry</a:t>
+            </a:r>
+            <a:endParaRPr lang="en-US" dirty="0" smtClean="0"/>
+          </a:p>
+        </p:txBody>
+      </p:sp>
+      <p:sp>
+        <p:nvSpPr>
+          <p:cNvPr id="5" name="Titel 4"/>
+          <p:cNvSpPr>
+            <a:spLocks noGrp="1"/>
+          </p:cNvSpPr>
+          <p:nvPr>
+            <p:ph type="title"/>
+          </p:nvPr>
+        </p:nvSpPr>
+        <p:spPr/>
+        <p:txBody>
+          <a:bodyPr/>
+          <a:lstStyle/>
+          <a:p>
+            <a:r>
+              <a:rPr lang="en-US" dirty="0" smtClean="0"/>
+              <a:t>Feedback</a:t>
+            </a:r>
+            <a:endParaRPr lang="en-US" dirty="0"/>
+          </a:p>
+        </p:txBody>
+      </p:sp>
+    </p:spTree>
+    <p:extLst>
+      <p:ext uri="{BB962C8B-B14F-4D97-AF65-F5344CB8AC3E}">
+        <p14:creationId xmlns:p14="http://schemas.microsoft.com/office/powerpoint/2010/main" val="3127611528"/>
+      </p:ext>
+    </p:extLst>
+  </p:cSld>
+  <p:clrMapOvr>
+    <a:masterClrMapping/>
+  </p:clrMapOvr>
+  <p:timing>
+    <p:tnLst>
+      <p:par>
+        <p:cTn id="1" dur="indefinite" restart="never" nodeType="tmRoot"/>
+      </p:par>
+    </p:tnLst>
+  </p:timing>
+</p:sld>
+</file>
+
+<file path=ppt/slides/slide22.xml><?xml version="1.0" encoding="utf-8"?>
+<p:sld xmlns:a="http://schemas.openxmlformats.org/drawingml/2006/main" xmlns:r="http://schemas.openxmlformats.org/officeDocument/2006/relationships" xmlns:p="http://schemas.openxmlformats.org/presentationml/2006/main">
+  <p:cSld>
+    <p:spTree>
+      <p:nvGrpSpPr>
+        <p:cNvPr id="1" name=""/>
+        <p:cNvGrpSpPr/>
+        <p:nvPr/>
+      </p:nvGrpSpPr>
+      <p:grpSpPr>
+        <a:xfrm>
+          <a:off x="0" y="0"/>
+          <a:ext cx="0" cy="0"/>
+          <a:chOff x="0" y="0"/>
+          <a:chExt cx="0" cy="0"/>
+        </a:xfrm>
+      </p:grpSpPr>
+      <p:sp>
+        <p:nvSpPr>
+          <p:cNvPr id="2" name="Inhaltsplatzhalter 1"/>
+          <p:cNvSpPr>
+            <a:spLocks noGrp="1"/>
+          </p:cNvSpPr>
+          <p:nvPr>
+            <p:ph idx="1"/>
+          </p:nvPr>
+        </p:nvSpPr>
+        <p:spPr/>
+        <p:txBody>
+          <a:bodyPr/>
+          <a:lstStyle/>
+          <a:p>
             <a:r>
               <a:rPr lang="en-US" sz="1200" b="1" dirty="0" err="1"/>
               <a:t>Abadi</a:t>
@@ -38213,7 +38450,7 @@
             <a:fld id="{CE58CB1E-F828-4F11-99E0-327109AF9DA4}" type="slidenum">
               <a:rPr lang="de-DE" smtClean="0"/>
               <a:pPr/>
-              <a:t>21</a:t>
+              <a:t>22</a:t>
             </a:fld>
             <a:endParaRPr lang="de-DE" dirty="0"/>
           </a:p>
@@ -40703,71 +40940,13 @@
             </a:pPr>
             <a:r>
               <a:rPr lang="en-US" sz="2000" dirty="0" smtClean="0"/>
-              <a:t>Better reproducibility of research results</a:t>
+              <a:t>Better reproducibility of research </a:t>
             </a:r>
-          </a:p>
-          <a:p>
-            <a:pPr marL="461963" lvl="1" indent="-285750">
-              <a:buFont typeface="Arial" panose="020B0604020202020204" pitchFamily="34" charset="0"/>
-              <a:buChar char="•"/>
-            </a:pPr>
-            <a:endParaRPr lang="en-US" sz="2000" dirty="0" smtClean="0"/>
-          </a:p>
-          <a:p>
-            <a:pPr marL="285750" indent="-285750">
-              <a:buFont typeface="Arial" panose="020B0604020202020204" pitchFamily="34" charset="0"/>
-              <a:buChar char="•"/>
-            </a:pPr>
-            <a:endParaRPr lang="en-US" sz="2000" i="1" dirty="0"/>
-          </a:p>
-          <a:p>
-            <a:pPr marL="285750" indent="-285750">
-              <a:buFont typeface="Arial" panose="020B0604020202020204" pitchFamily="34" charset="0"/>
-              <a:buChar char="•"/>
-            </a:pPr>
+            <a:r>
+              <a:rPr lang="en-US" sz="2000" dirty="0" smtClean="0"/>
+              <a:t>results</a:t>
+            </a:r>
             <a:endParaRPr lang="en-US" sz="2000" i="1" dirty="0" smtClean="0"/>
-          </a:p>
-          <a:p>
-            <a:pPr marL="285750" indent="-285750">
-              <a:buFont typeface="Arial" panose="020B0604020202020204" pitchFamily="34" charset="0"/>
-              <a:buChar char="•"/>
-            </a:pPr>
-            <a:endParaRPr lang="en-US" sz="2000" dirty="0"/>
-          </a:p>
-          <a:p>
-            <a:pPr marL="285750" indent="-285750">
-              <a:buFont typeface="Arial" panose="020B0604020202020204" pitchFamily="34" charset="0"/>
-              <a:buChar char="•"/>
-            </a:pPr>
-            <a:endParaRPr lang="en-US" sz="2000" dirty="0" smtClean="0"/>
-          </a:p>
-          <a:p>
-            <a:pPr marL="285750" indent="-285750">
-              <a:buFont typeface="Arial" panose="020B0604020202020204" pitchFamily="34" charset="0"/>
-              <a:buChar char="•"/>
-            </a:pPr>
-            <a:endParaRPr lang="en-US" sz="2000" dirty="0"/>
-          </a:p>
-          <a:p>
-            <a:pPr marL="285750" indent="-285750">
-              <a:buFont typeface="Arial" panose="020B0604020202020204" pitchFamily="34" charset="0"/>
-              <a:buChar char="•"/>
-            </a:pPr>
-            <a:endParaRPr lang="de-DE" sz="2000" dirty="0" smtClean="0"/>
-          </a:p>
-          <a:p>
-            <a:pPr marL="285750" indent="-285750">
-              <a:buFont typeface="Arial" panose="020B0604020202020204" pitchFamily="34" charset="0"/>
-              <a:buChar char="•"/>
-            </a:pPr>
-            <a:endParaRPr lang="de-DE" sz="2000" dirty="0"/>
-          </a:p>
-          <a:p>
-            <a:pPr marL="285750" indent="-285750">
-              <a:buFont typeface="Arial" panose="020B0604020202020204" pitchFamily="34" charset="0"/>
-              <a:buChar char="•"/>
-            </a:pPr>
-            <a:endParaRPr lang="en-US" sz="2200" dirty="0"/>
           </a:p>
         </p:txBody>
       </p:sp>
@@ -42566,7 +42745,7 @@
           <p:nvPr>
             <p:extLst>
               <p:ext uri="{D42A27DB-BD31-4B8C-83A1-F6EECF244321}">
-                <p14:modId xmlns:p14="http://schemas.microsoft.com/office/powerpoint/2010/main" val="3288479160"/>
+                <p14:modId xmlns:p14="http://schemas.microsoft.com/office/powerpoint/2010/main" val="2381185879"/>
               </p:ext>
             </p:extLst>
           </p:nvPr>
@@ -42968,12 +43147,16 @@
             <a:graphicFrameLocks/>
           </p:cNvGraphicFramePr>
           <p:nvPr>
-            <p:extLst/>
+            <p:extLst>
+              <p:ext uri="{D42A27DB-BD31-4B8C-83A1-F6EECF244321}">
+                <p14:modId xmlns:p14="http://schemas.microsoft.com/office/powerpoint/2010/main" val="948769325"/>
+              </p:ext>
+            </p:extLst>
           </p:nvPr>
         </p:nvGraphicFramePr>
         <p:xfrm>
-          <a:off x="530236" y="2351785"/>
-          <a:ext cx="8218351" cy="2226849"/>
+          <a:off x="530236" y="2538248"/>
+          <a:ext cx="8218351" cy="2040386"/>
         </p:xfrm>
         <a:graphic>
           <a:graphicData uri="http://schemas.openxmlformats.org/drawingml/2006/diagram">
@@ -43082,7 +43265,7 @@
           <a:prstGeom prst="bentConnector4">
             <a:avLst>
               <a:gd name="adj1" fmla="val -5570"/>
-              <a:gd name="adj2" fmla="val 84346"/>
+              <a:gd name="adj2" fmla="val 60674"/>
             </a:avLst>
           </a:prstGeom>
           <a:ln>

</xml_diff>

<commit_message>
updates slides (notebook links, screenshots with dlomix name)
</commit_message>
<xml_diff>
--- a/01_Intro_Slides_SummerSchool_Sep21.pptx
+++ b/01_Intro_Slides_SummerSchool_Sep21.pptx
@@ -23472,7 +23472,7 @@
               <a:pPr>
                 <a:defRPr/>
               </a:pPr>
-              <a:t>15/09/2021</a:t>
+              <a:t>16/09/2021</a:t>
             </a:fld>
             <a:endParaRPr lang="en-GB" dirty="0"/>
           </a:p>
@@ -23691,7 +23691,7 @@
               <a:pPr>
                 <a:defRPr/>
               </a:pPr>
-              <a:t>15/09/2021</a:t>
+              <a:t>16/09/2021</a:t>
             </a:fld>
             <a:endParaRPr lang="en-GB"/>
           </a:p>
@@ -24072,7 +24072,7 @@
         <p:spPr/>
         <p:txBody>
           <a:bodyPr>
-            <a:normAutofit fontScale="92500" lnSpcReduction="10000"/>
+            <a:normAutofit/>
           </a:bodyPr>
           <a:lstStyle/>
           <a:p>
@@ -34175,7 +34175,30 @@
           <a:p>
             <a:r>
               <a:rPr lang="en-US" sz="2000" dirty="0" smtClean="0"/>
-              <a:t>A Deep Learning Framework for Proteomics ???</a:t>
+              <a:t>Tutorial: The </a:t>
+            </a:r>
+            <a:r>
+              <a:rPr lang="en-US" sz="2000" dirty="0"/>
+              <a:t>generation of a retention time prediction </a:t>
+            </a:r>
+            <a:r>
+              <a:rPr lang="en-US" sz="2000" dirty="0" smtClean="0"/>
+              <a:t>model</a:t>
+            </a:r>
+            <a:r>
+              <a:rPr lang="en-US" sz="2000" dirty="0"/>
+              <a:t/>
+            </a:r>
+            <a:br>
+              <a:rPr lang="en-US" sz="2000" dirty="0"/>
+            </a:br>
+            <a:r>
+              <a:rPr lang="en-US" sz="1400" dirty="0" err="1" smtClean="0"/>
+              <a:t>DLOmix</a:t>
+            </a:r>
+            <a:r>
+              <a:rPr lang="en-US" sz="1400" dirty="0" smtClean="0"/>
+              <a:t> – framework for deep learning in proteomics</a:t>
             </a:r>
             <a:endParaRPr lang="de-DE" sz="2000" dirty="0"/>
           </a:p>
@@ -34203,7 +34226,7 @@
           <a:p>
             <a:r>
               <a:rPr lang="en-US" sz="1500" b="1" dirty="0" smtClean="0"/>
-              <a:t>Prof. Dr. Mathias Wilhelm</a:t>
+              <a:t>Mathias Wilhelm</a:t>
             </a:r>
             <a:endParaRPr lang="en-US" sz="1500" dirty="0" smtClean="0"/>
           </a:p>
@@ -34246,12 +34269,20 @@
           <a:lstStyle/>
           <a:p>
             <a:r>
+              <a:rPr lang="en-US" sz="1600" b="1" dirty="0" err="1" smtClean="0">
+                <a:solidFill>
+                  <a:schemeClr val="bg1"/>
+                </a:solidFill>
+              </a:rPr>
+              <a:t>PROTrEIN</a:t>
+            </a:r>
+            <a:r>
               <a:rPr lang="en-US" sz="1600" b="1" dirty="0" smtClean="0">
                 <a:solidFill>
                   <a:schemeClr val="bg1"/>
                 </a:solidFill>
               </a:rPr>
-              <a:t>Summer School Details here ???</a:t>
+              <a:t> Summer School</a:t>
             </a:r>
             <a:endParaRPr lang="en-US" sz="1600" b="1" dirty="0">
               <a:solidFill>
@@ -34810,15 +34841,7 @@
             </a:pPr>
             <a:r>
               <a:rPr lang="en-US" sz="2200" dirty="0" smtClean="0"/>
-              <a:t>Output: predicted </a:t>
-            </a:r>
-            <a:r>
-              <a:rPr lang="en-US" sz="2200" dirty="0" smtClean="0"/>
-              <a:t>indexed </a:t>
-            </a:r>
-            <a:r>
-              <a:rPr lang="en-US" sz="2200" dirty="0" smtClean="0"/>
-              <a:t>retention time</a:t>
+              <a:t>Output: predicted indexed retention time</a:t>
             </a:r>
           </a:p>
           <a:p>
@@ -34851,9 +34874,29 @@
             </a:r>
             <a:r>
               <a:rPr lang="en-US" sz="2200" dirty="0" smtClean="0"/>
-              <a:t> et al. (2019), a deep learning architecture for retention time prediction </a:t>
+              <a:t> et al. (2019), a deep learning architecture for retention time prediction</a:t>
             </a:r>
-            <a:endParaRPr lang="en-US" sz="2200" dirty="0"/>
+          </a:p>
+          <a:p>
+            <a:pPr lvl="3" indent="0">
+              <a:lnSpc>
+                <a:spcPct val="150000"/>
+              </a:lnSpc>
+              <a:buNone/>
+            </a:pPr>
+            <a:r>
+              <a:rPr lang="en-US" sz="2000" dirty="0" smtClean="0"/>
+              <a:t>(but we also have a simple </a:t>
+            </a:r>
+            <a:r>
+              <a:rPr lang="en-US" sz="2000" dirty="0" err="1" smtClean="0"/>
+              <a:t>DeepLC</a:t>
+            </a:r>
+            <a:r>
+              <a:rPr lang="en-US" sz="2000" dirty="0" smtClean="0"/>
+              <a:t> and a base 1D-CNN as examples)</a:t>
+            </a:r>
+            <a:endParaRPr lang="en-US" sz="2000" dirty="0"/>
           </a:p>
           <a:p>
             <a:endParaRPr lang="en-US" sz="2200" dirty="0"/>
@@ -35506,35 +35549,74 @@
           </a:solidFill>
         </p:spPr>
       </p:pic>
-      <p:pic>
-        <p:nvPicPr>
-          <p:cNvPr id="6" name="Grafik 5"/>
-          <p:cNvPicPr>
-            <a:picLocks noChangeAspect="1"/>
-          </p:cNvPicPr>
+      <p:grpSp>
+        <p:nvGrpSpPr>
+          <p:cNvPr id="9" name="Gruppieren 8"/>
+          <p:cNvGrpSpPr/>
           <p:nvPr/>
-        </p:nvPicPr>
-        <p:blipFill rotWithShape="1">
-          <a:blip r:embed="rId4">
-            <a:extLst>
-              <a:ext uri="{28A0092B-C50C-407E-A947-70E740481C1C}">
-                <a14:useLocalDpi xmlns:a14="http://schemas.microsoft.com/office/drawing/2010/main" val="0"/>
-              </a:ext>
-            </a:extLst>
-          </a:blip>
-          <a:srcRect l="9086" t="14954" r="8645" b="15111"/>
-          <a:stretch/>
-        </p:blipFill>
-        <p:spPr>
+        </p:nvGrpSpPr>
+        <p:grpSpPr>
           <a:xfrm>
             <a:off x="2438979" y="2418550"/>
             <a:ext cx="6580916" cy="3117277"/>
+            <a:chOff x="2438979" y="2418550"/>
+            <a:chExt cx="6580916" cy="3117277"/>
           </a:xfrm>
-          <a:prstGeom prst="rect">
-            <a:avLst/>
-          </a:prstGeom>
-        </p:spPr>
-      </p:pic>
+        </p:grpSpPr>
+        <p:pic>
+          <p:nvPicPr>
+            <p:cNvPr id="6" name="Grafik 5"/>
+            <p:cNvPicPr>
+              <a:picLocks noChangeAspect="1"/>
+            </p:cNvPicPr>
+            <p:nvPr/>
+          </p:nvPicPr>
+          <p:blipFill rotWithShape="1">
+            <a:blip r:embed="rId4">
+              <a:extLst>
+                <a:ext uri="{28A0092B-C50C-407E-A947-70E740481C1C}">
+                  <a14:useLocalDpi xmlns:a14="http://schemas.microsoft.com/office/drawing/2010/main" val="0"/>
+                </a:ext>
+              </a:extLst>
+            </a:blip>
+            <a:srcRect l="9086" t="14954" r="8645" b="15111"/>
+            <a:stretch/>
+          </p:blipFill>
+          <p:spPr>
+            <a:xfrm>
+              <a:off x="2438979" y="2418550"/>
+              <a:ext cx="6580916" cy="3117277"/>
+            </a:xfrm>
+            <a:prstGeom prst="rect">
+              <a:avLst/>
+            </a:prstGeom>
+          </p:spPr>
+        </p:pic>
+        <p:pic>
+          <p:nvPicPr>
+            <p:cNvPr id="8" name="Grafik 7"/>
+            <p:cNvPicPr>
+              <a:picLocks noChangeAspect="1"/>
+            </p:cNvPicPr>
+            <p:nvPr/>
+          </p:nvPicPr>
+          <p:blipFill>
+            <a:blip r:embed="rId5"/>
+            <a:stretch>
+              <a:fillRect/>
+            </a:stretch>
+          </p:blipFill>
+          <p:spPr>
+            <a:xfrm>
+              <a:off x="2576238" y="2909545"/>
+              <a:ext cx="5118341" cy="526354"/>
+            </a:xfrm>
+            <a:prstGeom prst="rect">
+              <a:avLst/>
+            </a:prstGeom>
+          </p:spPr>
+        </p:pic>
+      </p:grpSp>
     </p:spTree>
     <p:extLst>
       <p:ext uri="{BB962C8B-B14F-4D97-AF65-F5344CB8AC3E}">
@@ -35776,35 +35858,74 @@
           </a:solidFill>
         </p:spPr>
       </p:pic>
-      <p:pic>
-        <p:nvPicPr>
-          <p:cNvPr id="8" name="Grafik 7"/>
-          <p:cNvPicPr>
-            <a:picLocks noChangeAspect="1"/>
-          </p:cNvPicPr>
+      <p:grpSp>
+        <p:nvGrpSpPr>
+          <p:cNvPr id="9" name="Gruppieren 8"/>
+          <p:cNvGrpSpPr/>
           <p:nvPr/>
-        </p:nvPicPr>
-        <p:blipFill rotWithShape="1">
-          <a:blip r:embed="rId4">
-            <a:extLst>
-              <a:ext uri="{28A0092B-C50C-407E-A947-70E740481C1C}">
-                <a14:useLocalDpi xmlns:a14="http://schemas.microsoft.com/office/drawing/2010/main" val="0"/>
-              </a:ext>
-            </a:extLst>
-          </a:blip>
-          <a:srcRect l="9324" t="22755" r="9594" b="22755"/>
-          <a:stretch/>
-        </p:blipFill>
-        <p:spPr>
+        </p:nvGrpSpPr>
+        <p:grpSpPr>
           <a:xfrm>
             <a:off x="866562" y="3260958"/>
             <a:ext cx="7414054" cy="2137719"/>
+            <a:chOff x="866562" y="3260958"/>
+            <a:chExt cx="7414054" cy="2137719"/>
           </a:xfrm>
-          <a:prstGeom prst="rect">
-            <a:avLst/>
-          </a:prstGeom>
-        </p:spPr>
-      </p:pic>
+        </p:grpSpPr>
+        <p:pic>
+          <p:nvPicPr>
+            <p:cNvPr id="8" name="Grafik 7"/>
+            <p:cNvPicPr>
+              <a:picLocks noChangeAspect="1"/>
+            </p:cNvPicPr>
+            <p:nvPr/>
+          </p:nvPicPr>
+          <p:blipFill rotWithShape="1">
+            <a:blip r:embed="rId4">
+              <a:extLst>
+                <a:ext uri="{28A0092B-C50C-407E-A947-70E740481C1C}">
+                  <a14:useLocalDpi xmlns:a14="http://schemas.microsoft.com/office/drawing/2010/main" val="0"/>
+                </a:ext>
+              </a:extLst>
+            </a:blip>
+            <a:srcRect l="9324" t="22755" r="9594" b="22755"/>
+            <a:stretch/>
+          </p:blipFill>
+          <p:spPr>
+            <a:xfrm>
+              <a:off x="866562" y="3260958"/>
+              <a:ext cx="7414054" cy="2137719"/>
+            </a:xfrm>
+            <a:prstGeom prst="rect">
+              <a:avLst/>
+            </a:prstGeom>
+          </p:spPr>
+        </p:pic>
+        <p:pic>
+          <p:nvPicPr>
+            <p:cNvPr id="6" name="Grafik 5"/>
+            <p:cNvPicPr>
+              <a:picLocks noChangeAspect="1"/>
+            </p:cNvPicPr>
+            <p:nvPr/>
+          </p:nvPicPr>
+          <p:blipFill>
+            <a:blip r:embed="rId5"/>
+            <a:stretch>
+              <a:fillRect/>
+            </a:stretch>
+          </p:blipFill>
+          <p:spPr>
+            <a:xfrm>
+              <a:off x="967572" y="3773016"/>
+              <a:ext cx="7174478" cy="735844"/>
+            </a:xfrm>
+            <a:prstGeom prst="rect">
+              <a:avLst/>
+            </a:prstGeom>
+          </p:spPr>
+        </p:pic>
+      </p:grpSp>
     </p:spTree>
     <p:extLst>
       <p:ext uri="{BB962C8B-B14F-4D97-AF65-F5344CB8AC3E}">
@@ -36020,35 +36141,74 @@
           </a:solidFill>
         </p:spPr>
       </p:pic>
-      <p:pic>
-        <p:nvPicPr>
-          <p:cNvPr id="6" name="Grafik 5"/>
-          <p:cNvPicPr>
-            <a:picLocks noChangeAspect="1"/>
-          </p:cNvPicPr>
+      <p:grpSp>
+        <p:nvGrpSpPr>
+          <p:cNvPr id="9" name="Gruppieren 8"/>
+          <p:cNvGrpSpPr/>
           <p:nvPr/>
-        </p:nvPicPr>
-        <p:blipFill rotWithShape="1">
-          <a:blip r:embed="rId4">
-            <a:extLst>
-              <a:ext uri="{28A0092B-C50C-407E-A947-70E740481C1C}">
-                <a14:useLocalDpi xmlns:a14="http://schemas.microsoft.com/office/drawing/2010/main" val="0"/>
-              </a:ext>
-            </a:extLst>
-          </a:blip>
-          <a:srcRect l="7432" t="14394" r="7973" b="15852"/>
-          <a:stretch/>
-        </p:blipFill>
-        <p:spPr>
+        </p:nvGrpSpPr>
+        <p:grpSpPr>
           <a:xfrm>
             <a:off x="705924" y="2915370"/>
             <a:ext cx="7735329" cy="3546390"/>
+            <a:chOff x="705924" y="2915370"/>
+            <a:chExt cx="7735329" cy="3546390"/>
           </a:xfrm>
-          <a:prstGeom prst="rect">
-            <a:avLst/>
-          </a:prstGeom>
-        </p:spPr>
-      </p:pic>
+        </p:grpSpPr>
+        <p:pic>
+          <p:nvPicPr>
+            <p:cNvPr id="6" name="Grafik 5"/>
+            <p:cNvPicPr>
+              <a:picLocks noChangeAspect="1"/>
+            </p:cNvPicPr>
+            <p:nvPr/>
+          </p:nvPicPr>
+          <p:blipFill rotWithShape="1">
+            <a:blip r:embed="rId4">
+              <a:extLst>
+                <a:ext uri="{28A0092B-C50C-407E-A947-70E740481C1C}">
+                  <a14:useLocalDpi xmlns:a14="http://schemas.microsoft.com/office/drawing/2010/main" val="0"/>
+                </a:ext>
+              </a:extLst>
+            </a:blip>
+            <a:srcRect l="7432" t="14394" r="7973" b="15852"/>
+            <a:stretch/>
+          </p:blipFill>
+          <p:spPr>
+            <a:xfrm>
+              <a:off x="705924" y="2915370"/>
+              <a:ext cx="7735329" cy="3546390"/>
+            </a:xfrm>
+            <a:prstGeom prst="rect">
+              <a:avLst/>
+            </a:prstGeom>
+          </p:spPr>
+        </p:pic>
+        <p:pic>
+          <p:nvPicPr>
+            <p:cNvPr id="8" name="Grafik 7"/>
+            <p:cNvPicPr>
+              <a:picLocks noChangeAspect="1"/>
+            </p:cNvPicPr>
+            <p:nvPr/>
+          </p:nvPicPr>
+          <p:blipFill>
+            <a:blip r:embed="rId5"/>
+            <a:stretch>
+              <a:fillRect/>
+            </a:stretch>
+          </p:blipFill>
+          <p:spPr>
+            <a:xfrm>
+              <a:off x="792253" y="3264132"/>
+              <a:ext cx="4509322" cy="762984"/>
+            </a:xfrm>
+            <a:prstGeom prst="rect">
+              <a:avLst/>
+            </a:prstGeom>
+          </p:spPr>
+        </p:pic>
+      </p:grpSp>
     </p:spTree>
     <p:extLst>
       <p:ext uri="{BB962C8B-B14F-4D97-AF65-F5344CB8AC3E}">
@@ -36522,35 +36682,6 @@
       </p:pic>
       <p:pic>
         <p:nvPicPr>
-          <p:cNvPr id="6" name="Grafik 5"/>
-          <p:cNvPicPr>
-            <a:picLocks noChangeAspect="1"/>
-          </p:cNvPicPr>
-          <p:nvPr/>
-        </p:nvPicPr>
-        <p:blipFill rotWithShape="1">
-          <a:blip r:embed="rId4">
-            <a:extLst>
-              <a:ext uri="{28A0092B-C50C-407E-A947-70E740481C1C}">
-                <a14:useLocalDpi xmlns:a14="http://schemas.microsoft.com/office/drawing/2010/main" val="0"/>
-              </a:ext>
-            </a:extLst>
-          </a:blip>
-          <a:srcRect l="8484" t="10631" r="8631" b="10810"/>
-          <a:stretch/>
-        </p:blipFill>
-        <p:spPr>
-          <a:xfrm>
-            <a:off x="3237470" y="1637578"/>
-            <a:ext cx="5505935" cy="4263921"/>
-          </a:xfrm>
-          <a:prstGeom prst="rect">
-            <a:avLst/>
-          </a:prstGeom>
-        </p:spPr>
-      </p:pic>
-      <p:pic>
-        <p:nvPicPr>
           <p:cNvPr id="8" name="Grafik 7"/>
           <p:cNvPicPr>
             <a:picLocks noChangeAspect="1"/>
@@ -36558,7 +36689,7 @@
           <p:nvPr/>
         </p:nvPicPr>
         <p:blipFill>
-          <a:blip r:embed="rId5"/>
+          <a:blip r:embed="rId4"/>
           <a:stretch>
             <a:fillRect/>
           </a:stretch>
@@ -36573,6 +36704,74 @@
           </a:prstGeom>
         </p:spPr>
       </p:pic>
+      <p:grpSp>
+        <p:nvGrpSpPr>
+          <p:cNvPr id="10" name="Gruppieren 9"/>
+          <p:cNvGrpSpPr/>
+          <p:nvPr/>
+        </p:nvGrpSpPr>
+        <p:grpSpPr>
+          <a:xfrm>
+            <a:off x="3237470" y="1637578"/>
+            <a:ext cx="5505935" cy="4263921"/>
+            <a:chOff x="3237470" y="1637578"/>
+            <a:chExt cx="5505935" cy="4263921"/>
+          </a:xfrm>
+        </p:grpSpPr>
+        <p:pic>
+          <p:nvPicPr>
+            <p:cNvPr id="6" name="Grafik 5"/>
+            <p:cNvPicPr>
+              <a:picLocks noChangeAspect="1"/>
+            </p:cNvPicPr>
+            <p:nvPr/>
+          </p:nvPicPr>
+          <p:blipFill rotWithShape="1">
+            <a:blip r:embed="rId5">
+              <a:extLst>
+                <a:ext uri="{28A0092B-C50C-407E-A947-70E740481C1C}">
+                  <a14:useLocalDpi xmlns:a14="http://schemas.microsoft.com/office/drawing/2010/main" val="0"/>
+                </a:ext>
+              </a:extLst>
+            </a:blip>
+            <a:srcRect l="8484" t="10631" r="8631" b="10810"/>
+            <a:stretch/>
+          </p:blipFill>
+          <p:spPr>
+            <a:xfrm>
+              <a:off x="3237470" y="1637578"/>
+              <a:ext cx="5505935" cy="4263921"/>
+            </a:xfrm>
+            <a:prstGeom prst="rect">
+              <a:avLst/>
+            </a:prstGeom>
+          </p:spPr>
+        </p:pic>
+        <p:pic>
+          <p:nvPicPr>
+            <p:cNvPr id="9" name="Grafik 8"/>
+            <p:cNvPicPr>
+              <a:picLocks noChangeAspect="1"/>
+            </p:cNvPicPr>
+            <p:nvPr/>
+          </p:nvPicPr>
+          <p:blipFill>
+            <a:blip r:embed="rId6"/>
+            <a:stretch>
+              <a:fillRect/>
+            </a:stretch>
+          </p:blipFill>
+          <p:spPr>
+            <a:xfrm>
+              <a:off x="3341575" y="2014873"/>
+              <a:ext cx="4323822" cy="378781"/>
+            </a:xfrm>
+            <a:prstGeom prst="rect">
+              <a:avLst/>
+            </a:prstGeom>
+          </p:spPr>
+        </p:pic>
+      </p:grpSp>
     </p:spTree>
     <p:extLst>
       <p:ext uri="{BB962C8B-B14F-4D97-AF65-F5344CB8AC3E}">
@@ -36623,7 +36822,7 @@
         <p:spPr>
           <a:xfrm>
             <a:off x="319090" y="1762188"/>
-            <a:ext cx="8330640" cy="4699572"/>
+            <a:ext cx="8507918" cy="4699572"/>
           </a:xfrm>
         </p:spPr>
         <p:txBody>
@@ -36644,7 +36843,11 @@
             </a:r>
             <a:r>
               <a:rPr lang="en-US" sz="2000" dirty="0" smtClean="0"/>
-              <a:t> Notebook</a:t>
+              <a:t> </a:t>
+            </a:r>
+            <a:r>
+              <a:rPr lang="en-US" sz="2000" dirty="0" smtClean="0"/>
+              <a:t>Notebook: </a:t>
             </a:r>
           </a:p>
           <a:p>
@@ -36652,40 +36855,41 @@
               <a:buFont typeface="Arial" panose="020B0604020202020204" pitchFamily="34" charset="0"/>
               <a:buChar char="•"/>
             </a:pPr>
-            <a:endParaRPr lang="en-US" sz="2000" dirty="0"/>
+            <a:endParaRPr lang="en-US" sz="2000" i="1" dirty="0"/>
           </a:p>
           <a:p>
-            <a:pPr marL="285750" indent="-285750">
-              <a:buFont typeface="Arial" panose="020B0604020202020204" pitchFamily="34" charset="0"/>
-              <a:buChar char="•"/>
-            </a:pPr>
-            <a:endParaRPr lang="en-US" sz="2000" dirty="0" smtClean="0"/>
+            <a:r>
+              <a:rPr lang="en-US" sz="2000" i="1" dirty="0" smtClean="0"/>
+              <a:t>			</a:t>
+            </a:r>
+            <a:r>
+              <a:rPr lang="en-US" sz="2000" i="1" dirty="0" err="1" smtClean="0"/>
+              <a:t>Example_RTModel_Walkthough</a:t>
+            </a:r>
+            <a:endParaRPr lang="en-US" sz="2000" i="1" dirty="0" smtClean="0"/>
           </a:p>
           <a:p>
             <a:r>
               <a:rPr lang="en-US" sz="2000" dirty="0"/>
               <a:t>	</a:t>
             </a:r>
+            <a:endParaRPr lang="en-US" sz="2000" dirty="0" smtClean="0"/>
+          </a:p>
+          <a:p>
+            <a:pPr algn="ctr"/>
             <a:r>
               <a:rPr lang="en-US" sz="2000" dirty="0" smtClean="0"/>
-              <a:t>	</a:t>
+              <a:t>Notebook Link: </a:t>
             </a:r>
             <a:r>
               <a:rPr lang="en-US" sz="2000" dirty="0" err="1" smtClean="0">
-                <a:hlinkClick r:id="rId3" action="ppaction://hlinkfile"/>
+                <a:hlinkClick r:id="rId3"/>
               </a:rPr>
-              <a:t>Example_RTModel_Walkthrough</a:t>
+              <a:t>Example_RTModel_Walkthrough_colab.ipynb</a:t>
             </a:r>
-            <a:r>
-              <a:rPr lang="en-US" sz="2000" dirty="0" smtClean="0"/>
-              <a:t> (Link???)</a:t>
-            </a:r>
+            <a:endParaRPr lang="en-US" sz="2000" dirty="0"/>
           </a:p>
           <a:p>
-            <a:pPr marL="461963" lvl="1" indent="-285750">
-              <a:buFont typeface="Arial" panose="020B0604020202020204" pitchFamily="34" charset="0"/>
-              <a:buChar char="•"/>
-            </a:pPr>
             <a:endParaRPr lang="en-US" sz="2000" dirty="0" smtClean="0"/>
           </a:p>
           <a:p>
@@ -36809,6 +37013,32 @@
           </a:solidFill>
         </p:spPr>
       </p:pic>
+      <p:pic>
+        <p:nvPicPr>
+          <p:cNvPr id="6" name="Grafik 5">
+            <a:hlinkClick r:id="rId5"/>
+          </p:cNvPr>
+          <p:cNvPicPr>
+            <a:picLocks noChangeAspect="1"/>
+          </p:cNvPicPr>
+          <p:nvPr/>
+        </p:nvPicPr>
+        <p:blipFill>
+          <a:blip r:embed="rId6"/>
+          <a:stretch>
+            <a:fillRect/>
+          </a:stretch>
+        </p:blipFill>
+        <p:spPr>
+          <a:xfrm>
+            <a:off x="3369834" y="3858304"/>
+            <a:ext cx="2314898" cy="647790"/>
+          </a:xfrm>
+          <a:prstGeom prst="rect">
+            <a:avLst/>
+          </a:prstGeom>
+        </p:spPr>
+      </p:pic>
     </p:spTree>
     <p:extLst>
       <p:ext uri="{BB962C8B-B14F-4D97-AF65-F5344CB8AC3E}">
@@ -36881,15 +37111,9 @@
             <a:r>
               <a:rPr lang="en-US" sz="2000" b="1" dirty="0" smtClean="0">
                 <a:sym typeface="Wingdings" panose="05000000000000000000" pitchFamily="2" charset="2"/>
-                <a:hlinkClick r:id="rId3" action="ppaction://hlinkfile"/>
+                <a:hlinkClick r:id="rId3"/>
               </a:rPr>
               <a:t>Notebook</a:t>
-            </a:r>
-            <a:r>
-              <a:rPr lang="en-US" sz="2000" b="1" dirty="0" smtClean="0">
-                <a:sym typeface="Wingdings" panose="05000000000000000000" pitchFamily="2" charset="2"/>
-              </a:rPr>
-              <a:t> (Link ???)</a:t>
             </a:r>
             <a:endParaRPr lang="en-US" sz="2000" b="1" dirty="0" smtClean="0"/>
           </a:p>
@@ -36903,28 +37127,11 @@
             </a:pPr>
             <a:r>
               <a:rPr lang="en-US" sz="1800" dirty="0" smtClean="0"/>
-              <a:t>Use </a:t>
-            </a:r>
-            <a:r>
-              <a:rPr lang="en-US" sz="1800" dirty="0" err="1" smtClean="0"/>
-              <a:t>train_model</a:t>
+              <a:t>check </a:t>
             </a:r>
             <a:r>
               <a:rPr lang="en-US" sz="1800" dirty="0" smtClean="0"/>
-              <a:t> method with different learning rates</a:t>
-            </a:r>
-          </a:p>
-          <a:p>
-            <a:pPr marL="461963" lvl="1" indent="-285750">
-              <a:lnSpc>
-                <a:spcPct val="150000"/>
-              </a:lnSpc>
-              <a:buFont typeface="Courier New" panose="02070309020205020404" pitchFamily="49" charset="0"/>
-              <a:buChar char="o"/>
-            </a:pPr>
-            <a:r>
-              <a:rPr lang="en-US" sz="1800" dirty="0" smtClean="0"/>
-              <a:t>check which learning rate would be the best to work with our dataset</a:t>
+              <a:t>which learning rate would be the best to work with our dataset</a:t>
             </a:r>
             <a:endParaRPr lang="en-US" sz="1800" dirty="0"/>
           </a:p>
@@ -36957,17 +37164,11 @@
               <a:t> </a:t>
             </a:r>
             <a:r>
-              <a:rPr lang="en-US" sz="2000" b="1" dirty="0">
+              <a:rPr lang="en-US" sz="2000" b="1" dirty="0" smtClean="0">
                 <a:sym typeface="Wingdings" panose="05000000000000000000" pitchFamily="2" charset="2"/>
-                <a:hlinkClick r:id="rId3" action="ppaction://hlinkfile"/>
+                <a:hlinkClick r:id="rId4"/>
               </a:rPr>
               <a:t>Notebook</a:t>
-            </a:r>
-            <a:r>
-              <a:rPr lang="en-US" sz="2000" b="1" dirty="0">
-                <a:sym typeface="Wingdings" panose="05000000000000000000" pitchFamily="2" charset="2"/>
-              </a:rPr>
-              <a:t> (Link ???)</a:t>
             </a:r>
             <a:endParaRPr lang="en-US" sz="2000" b="1" dirty="0"/>
           </a:p>
@@ -37038,30 +37239,32 @@
               <a:t>, </a:t>
             </a:r>
             <a:r>
-              <a:rPr lang="en-US" sz="1800" dirty="0" err="1" smtClean="0"/>
-              <a:t>mape</a:t>
-            </a:r>
-            <a:r>
               <a:rPr lang="en-US" sz="1800" dirty="0" smtClean="0"/>
-              <a:t> </a:t>
+              <a:t>map</a:t>
             </a:r>
             <a:r>
               <a:rPr lang="en-US" sz="1800" dirty="0" smtClean="0">
                 <a:sym typeface="Wingdings" panose="05000000000000000000" pitchFamily="2" charset="2"/>
               </a:rPr>
-              <a:t> check </a:t>
+              <a:t> </a:t>
+            </a:r>
+            <a:r>
+              <a:rPr lang="en-US" sz="1800" dirty="0" smtClean="0">
+                <a:sym typeface="Wingdings" panose="05000000000000000000" pitchFamily="2" charset="2"/>
+              </a:rPr>
+              <a:t>check </a:t>
             </a:r>
             <a:r>
               <a:rPr lang="en-US" sz="1800" dirty="0" err="1" smtClean="0">
                 <a:sym typeface="Wingdings" panose="05000000000000000000" pitchFamily="2" charset="2"/>
-                <a:hlinkClick r:id="rId4"/>
+                <a:hlinkClick r:id="rId5"/>
               </a:rPr>
               <a:t>tf.keras</a:t>
             </a:r>
             <a:r>
               <a:rPr lang="en-US" sz="1800" dirty="0" smtClean="0">
                 <a:sym typeface="Wingdings" panose="05000000000000000000" pitchFamily="2" charset="2"/>
-                <a:hlinkClick r:id="rId4"/>
+                <a:hlinkClick r:id="rId5"/>
               </a:rPr>
               <a:t> documentation</a:t>
             </a:r>
@@ -37155,7 +37358,7 @@
           <p:nvPr/>
         </p:nvPicPr>
         <p:blipFill>
-          <a:blip r:embed="rId5">
+          <a:blip r:embed="rId6">
             <a:duotone>
               <a:schemeClr val="bg2">
                 <a:shade val="45000"/>
@@ -37620,17 +37823,11 @@
               <a:t> </a:t>
             </a:r>
             <a:r>
-              <a:rPr lang="en-US" sz="2000" b="1" dirty="0">
+              <a:rPr lang="en-US" sz="2000" b="1" dirty="0" smtClean="0">
                 <a:sym typeface="Wingdings" panose="05000000000000000000" pitchFamily="2" charset="2"/>
-                <a:hlinkClick r:id="rId3" action="ppaction://hlinkfile"/>
+                <a:hlinkClick r:id="rId3"/>
               </a:rPr>
               <a:t>Notebook</a:t>
-            </a:r>
-            <a:r>
-              <a:rPr lang="en-US" sz="2000" b="1" dirty="0">
-                <a:sym typeface="Wingdings" panose="05000000000000000000" pitchFamily="2" charset="2"/>
-              </a:rPr>
-              <a:t> (Link ???)</a:t>
             </a:r>
             <a:endParaRPr lang="en-US" sz="2000" b="1" dirty="0"/>
           </a:p>
@@ -37740,17 +37937,11 @@
               <a:t> </a:t>
             </a:r>
             <a:r>
-              <a:rPr lang="en-US" sz="2000" b="1" dirty="0">
+              <a:rPr lang="en-US" sz="2000" b="1" dirty="0" smtClean="0">
                 <a:sym typeface="Wingdings" panose="05000000000000000000" pitchFamily="2" charset="2"/>
-                <a:hlinkClick r:id="rId3" action="ppaction://hlinkfile"/>
+                <a:hlinkClick r:id="rId4"/>
               </a:rPr>
               <a:t>Notebook</a:t>
-            </a:r>
-            <a:r>
-              <a:rPr lang="en-US" sz="2000" b="1" dirty="0">
-                <a:sym typeface="Wingdings" panose="05000000000000000000" pitchFamily="2" charset="2"/>
-              </a:rPr>
-              <a:t> (Link ???)</a:t>
             </a:r>
             <a:endParaRPr lang="en-US" sz="2000" b="1" dirty="0"/>
           </a:p>
@@ -37768,7 +37959,7 @@
             </a:r>
             <a:r>
               <a:rPr lang="en-US" sz="1800" dirty="0" smtClean="0"/>
-              <a:t>you omit </a:t>
+              <a:t>we omitted </a:t>
             </a:r>
             <a:r>
               <a:rPr lang="en-US" sz="1800" dirty="0"/>
@@ -37822,6 +38013,19 @@
             <a:r>
               <a:rPr lang="en-US" sz="1800" dirty="0" smtClean="0"/>
               <a:t>dataset</a:t>
+            </a:r>
+          </a:p>
+          <a:p>
+            <a:pPr marL="461963" lvl="1" indent="-285750">
+              <a:lnSpc>
+                <a:spcPct val="150000"/>
+              </a:lnSpc>
+              <a:buFont typeface="Courier New" panose="02070309020205020404" pitchFamily="49" charset="0"/>
+              <a:buChar char="o"/>
+            </a:pPr>
+            <a:r>
+              <a:rPr lang="en-US" sz="1800" dirty="0" smtClean="0"/>
+              <a:t>What was omitted?</a:t>
             </a:r>
             <a:endParaRPr lang="en-US" sz="2200" dirty="0" smtClean="0"/>
           </a:p>
@@ -37913,7 +38117,7 @@
           <p:nvPr/>
         </p:nvPicPr>
         <p:blipFill>
-          <a:blip r:embed="rId4">
+          <a:blip r:embed="rId5">
             <a:duotone>
               <a:schemeClr val="bg2">
                 <a:shade val="45000"/>
@@ -38007,7 +38211,7 @@
             </a:pPr>
             <a:r>
               <a:rPr lang="en-US" sz="2400" dirty="0" smtClean="0"/>
-              <a:t>At this stage, we definitely appreciate your feedback:</a:t>
+              <a:t>At this stage, we very much appreciate your feedback on</a:t>
             </a:r>
           </a:p>
           <a:p>
@@ -38020,7 +38224,7 @@
             </a:pPr>
             <a:r>
               <a:rPr lang="en-US" sz="2400" dirty="0" smtClean="0"/>
-              <a:t>the sessions</a:t>
+              <a:t>The session</a:t>
             </a:r>
           </a:p>
           <a:p>
@@ -38032,8 +38236,12 @@
               <a:buChar char="o"/>
             </a:pPr>
             <a:r>
+              <a:rPr lang="en-US" sz="2400" dirty="0"/>
+              <a:t>T</a:t>
+            </a:r>
+            <a:r>
               <a:rPr lang="en-US" sz="2400" dirty="0" smtClean="0"/>
-              <a:t>The current API and modules</a:t>
+              <a:t>he current API and modules</a:t>
             </a:r>
           </a:p>
           <a:p>
@@ -38045,8 +38253,12 @@
               <a:buChar char="o"/>
             </a:pPr>
             <a:r>
+              <a:rPr lang="en-US" sz="2400" dirty="0"/>
+              <a:t>W</a:t>
+            </a:r>
+            <a:r>
               <a:rPr lang="en-US" sz="2400" dirty="0" smtClean="0"/>
-              <a:t>What is good</a:t>
+              <a:t>hat is good?</a:t>
             </a:r>
           </a:p>
           <a:p>
@@ -38058,8 +38270,12 @@
               <a:buChar char="o"/>
             </a:pPr>
             <a:r>
+              <a:rPr lang="en-US" sz="2400" dirty="0"/>
+              <a:t>W</a:t>
+            </a:r>
+            <a:r>
               <a:rPr lang="en-US" sz="2400" dirty="0" smtClean="0"/>
-              <a:t>What can be improved</a:t>
+              <a:t>hat can be improved?</a:t>
             </a:r>
           </a:p>
           <a:p>
@@ -40940,11 +41156,7 @@
             </a:pPr>
             <a:r>
               <a:rPr lang="en-US" sz="2000" dirty="0" smtClean="0"/>
-              <a:t>Better reproducibility of research </a:t>
-            </a:r>
-            <a:r>
-              <a:rPr lang="en-US" sz="2000" dirty="0" smtClean="0"/>
-              <a:t>results</a:t>
+              <a:t>Better reproducibility of research results</a:t>
             </a:r>
             <a:endParaRPr lang="en-US" sz="2000" i="1" dirty="0" smtClean="0"/>
           </a:p>

</xml_diff>

<commit_message>
updated slides (task slides, removed mape)
</commit_message>
<xml_diff>
--- a/01_Intro_Slides_SummerSchool_Sep21.pptx
+++ b/01_Intro_Slides_SummerSchool_Sep21.pptx
@@ -10,10 +10,10 @@
     <p:sldMasterId id="2147483697" r:id="rId6"/>
   </p:sldMasterIdLst>
   <p:notesMasterIdLst>
-    <p:notesMasterId r:id="rId29"/>
+    <p:notesMasterId r:id="rId31"/>
   </p:notesMasterIdLst>
   <p:handoutMasterIdLst>
-    <p:handoutMasterId r:id="rId30"/>
+    <p:handoutMasterId r:id="rId32"/>
   </p:handoutMasterIdLst>
   <p:sldIdLst>
     <p:sldId id="356" r:id="rId7"/>
@@ -35,9 +35,11 @@
     <p:sldId id="423" r:id="rId23"/>
     <p:sldId id="425" r:id="rId24"/>
     <p:sldId id="426" r:id="rId25"/>
-    <p:sldId id="407" r:id="rId26"/>
-    <p:sldId id="427" r:id="rId27"/>
-    <p:sldId id="404" r:id="rId28"/>
+    <p:sldId id="428" r:id="rId26"/>
+    <p:sldId id="407" r:id="rId27"/>
+    <p:sldId id="429" r:id="rId28"/>
+    <p:sldId id="427" r:id="rId29"/>
+    <p:sldId id="404" r:id="rId30"/>
   </p:sldIdLst>
   <p:sldSz cx="9144000" cy="6858000" type="screen4x3"/>
   <p:notesSz cx="9925050" cy="6665913"/>
@@ -8000,25 +8002,25 @@
     </dgm:pt>
   </dgm:ptLst>
   <dgm:cxnLst>
-    <dgm:cxn modelId="{9D24A32B-8DC9-46D3-A42C-34E0428B681F}" type="presOf" srcId="{0A62A2D2-2C68-4160-ABAD-6D27E952343A}" destId="{CDB32B99-34EF-4BB9-B24C-83A8F8CD547A}" srcOrd="0" destOrd="0" presId="urn:microsoft.com/office/officeart/2005/8/layout/hierarchy4"/>
-    <dgm:cxn modelId="{34BA71EC-6458-4B62-9A49-C377FC30999F}" type="presOf" srcId="{74491842-E00F-4583-B12F-1B1D6B36D109}" destId="{D818B6D9-FAA2-496D-B78C-22D2B03C2AFB}" srcOrd="0" destOrd="0" presId="urn:microsoft.com/office/officeart/2005/8/layout/hierarchy4"/>
+    <dgm:cxn modelId="{94BE4E1A-D39F-46E6-8B14-0B06FED7A139}" type="presOf" srcId="{9AF08940-8F50-42E3-8DD1-817CF3E8FD90}" destId="{E5992A07-26E4-4819-860A-49810989A2A2}" srcOrd="0" destOrd="0" presId="urn:microsoft.com/office/officeart/2005/8/layout/hierarchy4"/>
     <dgm:cxn modelId="{4975BFCF-74FB-4124-8457-7871F1FCA6EF}" srcId="{0A62A2D2-2C68-4160-ABAD-6D27E952343A}" destId="{C60D5758-00C3-4746-A617-FF46493E9EDD}" srcOrd="0" destOrd="0" parTransId="{48DB7401-C4C4-41E3-8D26-736AF916FE13}" sibTransId="{FEDAD44C-D3D1-4C46-9D9B-808BFEC7CD5F}"/>
-    <dgm:cxn modelId="{338BB73B-9D58-4DD5-B3C6-192F34912787}" type="presOf" srcId="{BADA98C9-C6C5-4BA0-AACB-C96224DC85B8}" destId="{2C9F7DE9-8967-4E67-AF88-B5944B425068}" srcOrd="0" destOrd="0" presId="urn:microsoft.com/office/officeart/2005/8/layout/hierarchy4"/>
-    <dgm:cxn modelId="{3C52AEF0-92E2-4512-B7E8-3E00CD1C910E}" type="presOf" srcId="{89D21CD8-7BFA-485E-8130-8DD0836F5F64}" destId="{3B3A6269-3535-42DF-BA97-F99FE5A6A445}" srcOrd="0" destOrd="0" presId="urn:microsoft.com/office/officeart/2005/8/layout/hierarchy4"/>
-    <dgm:cxn modelId="{64169066-F6B4-40C9-BB4F-CDF5A3ACFB09}" type="presOf" srcId="{C60D5758-00C3-4746-A617-FF46493E9EDD}" destId="{98BDFE83-4B5F-468C-8484-FB1895872045}" srcOrd="0" destOrd="0" presId="urn:microsoft.com/office/officeart/2005/8/layout/hierarchy4"/>
-    <dgm:cxn modelId="{15A3C65F-97D5-4AA6-A36E-2E5B288695A9}" type="presOf" srcId="{C5FAF08E-12E1-4EEB-975C-D08BAA891F50}" destId="{8A6199F2-F1DB-4146-970C-9EBFF04B7FED}" srcOrd="0" destOrd="0" presId="urn:microsoft.com/office/officeart/2005/8/layout/hierarchy4"/>
-    <dgm:cxn modelId="{74ECB6A8-EE60-4491-87CC-1EC2C3049C64}" srcId="{C60D5758-00C3-4746-A617-FF46493E9EDD}" destId="{74491842-E00F-4583-B12F-1B1D6B36D109}" srcOrd="6" destOrd="0" parTransId="{53DD2106-876B-4B35-B799-611348256BBF}" sibTransId="{AB07B637-A3A2-4C27-AA26-2CDF7F6B5E9F}"/>
-    <dgm:cxn modelId="{F51973FB-DA7B-47B6-A182-430100BCE217}" type="presOf" srcId="{586F1ADE-C9C6-4AB5-BADC-A9CC01A03786}" destId="{8498E32E-2AD0-4451-86A6-4DC2D6F7D6A0}" srcOrd="0" destOrd="0" presId="urn:microsoft.com/office/officeart/2005/8/layout/hierarchy4"/>
-    <dgm:cxn modelId="{1710F7A5-1965-40C4-A0F3-2F89786584D2}" srcId="{C60D5758-00C3-4746-A617-FF46493E9EDD}" destId="{89D21CD8-7BFA-485E-8130-8DD0836F5F64}" srcOrd="7" destOrd="0" parTransId="{FD20DF20-3E39-4404-AC64-B30C5B1DE0BC}" sibTransId="{FCD9E418-4054-4447-9573-D43C62815787}"/>
-    <dgm:cxn modelId="{87D0E14C-4EB3-450D-82C3-14852314B8EC}" type="presOf" srcId="{0F62DDD0-B0E5-4E77-BA8B-67C4EB1FCD6B}" destId="{FC021332-E035-4C7B-BDF2-8E4FCA1A9380}" srcOrd="0" destOrd="0" presId="urn:microsoft.com/office/officeart/2005/8/layout/hierarchy4"/>
-    <dgm:cxn modelId="{560F8B63-FC32-4231-A824-45A802EC2C38}" srcId="{C60D5758-00C3-4746-A617-FF46493E9EDD}" destId="{586F1ADE-C9C6-4AB5-BADC-A9CC01A03786}" srcOrd="5" destOrd="0" parTransId="{6A743BC4-EACB-46E4-AD32-E201089783CD}" sibTransId="{5A5A11FD-61CC-422E-8E6E-D4F805FEC423}"/>
-    <dgm:cxn modelId="{94BE4E1A-D39F-46E6-8B14-0B06FED7A139}" type="presOf" srcId="{9AF08940-8F50-42E3-8DD1-817CF3E8FD90}" destId="{E5992A07-26E4-4819-860A-49810989A2A2}" srcOrd="0" destOrd="0" presId="urn:microsoft.com/office/officeart/2005/8/layout/hierarchy4"/>
     <dgm:cxn modelId="{3F980A2C-CE99-445A-AF9C-75F2503C35AE}" type="presOf" srcId="{C440D376-663A-432F-9437-1B0008E907F1}" destId="{099B7531-33CC-4255-9EF9-0181C377F7EB}" srcOrd="0" destOrd="0" presId="urn:microsoft.com/office/officeart/2005/8/layout/hierarchy4"/>
     <dgm:cxn modelId="{598F9C60-6DDA-47D6-97E4-1D850096BD4B}" srcId="{C60D5758-00C3-4746-A617-FF46493E9EDD}" destId="{C5FAF08E-12E1-4EEB-975C-D08BAA891F50}" srcOrd="4" destOrd="0" parTransId="{F0A6CEF4-789E-4560-8520-9C56C64D5570}" sibTransId="{C0783238-4617-43D4-8268-DF00E4371B0D}"/>
+    <dgm:cxn modelId="{9D24A32B-8DC9-46D3-A42C-34E0428B681F}" type="presOf" srcId="{0A62A2D2-2C68-4160-ABAD-6D27E952343A}" destId="{CDB32B99-34EF-4BB9-B24C-83A8F8CD547A}" srcOrd="0" destOrd="0" presId="urn:microsoft.com/office/officeart/2005/8/layout/hierarchy4"/>
     <dgm:cxn modelId="{F3646EAC-966D-435F-B473-D5C4EA812C34}" srcId="{C60D5758-00C3-4746-A617-FF46493E9EDD}" destId="{C440D376-663A-432F-9437-1B0008E907F1}" srcOrd="3" destOrd="0" parTransId="{8981B875-5D0B-4419-8656-4F73F48A3C91}" sibTransId="{E53D378A-A5CB-410F-91DD-C706FE4B66DE}"/>
+    <dgm:cxn modelId="{1710F7A5-1965-40C4-A0F3-2F89786584D2}" srcId="{C60D5758-00C3-4746-A617-FF46493E9EDD}" destId="{89D21CD8-7BFA-485E-8130-8DD0836F5F64}" srcOrd="7" destOrd="0" parTransId="{FD20DF20-3E39-4404-AC64-B30C5B1DE0BC}" sibTransId="{FCD9E418-4054-4447-9573-D43C62815787}"/>
     <dgm:cxn modelId="{C29C3342-FB37-4A1E-B0DF-A5EF81EF5684}" srcId="{C60D5758-00C3-4746-A617-FF46493E9EDD}" destId="{0F62DDD0-B0E5-4E77-BA8B-67C4EB1FCD6B}" srcOrd="2" destOrd="0" parTransId="{B1661716-5D8F-46D2-82A4-0E2335F2B016}" sibTransId="{EE3E0944-D3C5-4A18-BB1E-20D40D9EF803}"/>
+    <dgm:cxn modelId="{87D0E14C-4EB3-450D-82C3-14852314B8EC}" type="presOf" srcId="{0F62DDD0-B0E5-4E77-BA8B-67C4EB1FCD6B}" destId="{FC021332-E035-4C7B-BDF2-8E4FCA1A9380}" srcOrd="0" destOrd="0" presId="urn:microsoft.com/office/officeart/2005/8/layout/hierarchy4"/>
+    <dgm:cxn modelId="{F51973FB-DA7B-47B6-A182-430100BCE217}" type="presOf" srcId="{586F1ADE-C9C6-4AB5-BADC-A9CC01A03786}" destId="{8498E32E-2AD0-4451-86A6-4DC2D6F7D6A0}" srcOrd="0" destOrd="0" presId="urn:microsoft.com/office/officeart/2005/8/layout/hierarchy4"/>
     <dgm:cxn modelId="{ACD09680-D70D-4248-B1CA-E54676D4AEA0}" srcId="{C60D5758-00C3-4746-A617-FF46493E9EDD}" destId="{BADA98C9-C6C5-4BA0-AACB-C96224DC85B8}" srcOrd="1" destOrd="0" parTransId="{7F52105F-190A-417F-A510-B2DA859E04C8}" sibTransId="{7A8CF0B3-7824-4842-9B4D-FFEDCFB812D3}"/>
+    <dgm:cxn modelId="{64169066-F6B4-40C9-BB4F-CDF5A3ACFB09}" type="presOf" srcId="{C60D5758-00C3-4746-A617-FF46493E9EDD}" destId="{98BDFE83-4B5F-468C-8484-FB1895872045}" srcOrd="0" destOrd="0" presId="urn:microsoft.com/office/officeart/2005/8/layout/hierarchy4"/>
+    <dgm:cxn modelId="{74ECB6A8-EE60-4491-87CC-1EC2C3049C64}" srcId="{C60D5758-00C3-4746-A617-FF46493E9EDD}" destId="{74491842-E00F-4583-B12F-1B1D6B36D109}" srcOrd="6" destOrd="0" parTransId="{53DD2106-876B-4B35-B799-611348256BBF}" sibTransId="{AB07B637-A3A2-4C27-AA26-2CDF7F6B5E9F}"/>
     <dgm:cxn modelId="{A035BD28-D95E-4994-BF72-59A2640A712D}" srcId="{C60D5758-00C3-4746-A617-FF46493E9EDD}" destId="{9AF08940-8F50-42E3-8DD1-817CF3E8FD90}" srcOrd="0" destOrd="0" parTransId="{2F4166DE-3361-4625-8DFF-F8764D5BE21D}" sibTransId="{D31CA3CF-BEC2-4733-90FA-55F7596F769C}"/>
+    <dgm:cxn modelId="{34BA71EC-6458-4B62-9A49-C377FC30999F}" type="presOf" srcId="{74491842-E00F-4583-B12F-1B1D6B36D109}" destId="{D818B6D9-FAA2-496D-B78C-22D2B03C2AFB}" srcOrd="0" destOrd="0" presId="urn:microsoft.com/office/officeart/2005/8/layout/hierarchy4"/>
+    <dgm:cxn modelId="{338BB73B-9D58-4DD5-B3C6-192F34912787}" type="presOf" srcId="{BADA98C9-C6C5-4BA0-AACB-C96224DC85B8}" destId="{2C9F7DE9-8967-4E67-AF88-B5944B425068}" srcOrd="0" destOrd="0" presId="urn:microsoft.com/office/officeart/2005/8/layout/hierarchy4"/>
+    <dgm:cxn modelId="{15A3C65F-97D5-4AA6-A36E-2E5B288695A9}" type="presOf" srcId="{C5FAF08E-12E1-4EEB-975C-D08BAA891F50}" destId="{8A6199F2-F1DB-4146-970C-9EBFF04B7FED}" srcOrd="0" destOrd="0" presId="urn:microsoft.com/office/officeart/2005/8/layout/hierarchy4"/>
+    <dgm:cxn modelId="{3C52AEF0-92E2-4512-B7E8-3E00CD1C910E}" type="presOf" srcId="{89D21CD8-7BFA-485E-8130-8DD0836F5F64}" destId="{3B3A6269-3535-42DF-BA97-F99FE5A6A445}" srcOrd="0" destOrd="0" presId="urn:microsoft.com/office/officeart/2005/8/layout/hierarchy4"/>
+    <dgm:cxn modelId="{560F8B63-FC32-4231-A824-45A802EC2C38}" srcId="{C60D5758-00C3-4746-A617-FF46493E9EDD}" destId="{586F1ADE-C9C6-4AB5-BADC-A9CC01A03786}" srcOrd="5" destOrd="0" parTransId="{6A743BC4-EACB-46E4-AD32-E201089783CD}" sibTransId="{5A5A11FD-61CC-422E-8E6E-D4F805FEC423}"/>
     <dgm:cxn modelId="{F71C4AFA-D7E9-474E-83D9-D60260F22C86}" type="presParOf" srcId="{CDB32B99-34EF-4BB9-B24C-83A8F8CD547A}" destId="{F21BA205-310C-42E7-B5E0-2C5189480B02}" srcOrd="0" destOrd="0" presId="urn:microsoft.com/office/officeart/2005/8/layout/hierarchy4"/>
     <dgm:cxn modelId="{A2EF5D19-0A64-414A-B902-ED1186E09A65}" type="presParOf" srcId="{F21BA205-310C-42E7-B5E0-2C5189480B02}" destId="{98BDFE83-4B5F-468C-8484-FB1895872045}" srcOrd="0" destOrd="0" presId="urn:microsoft.com/office/officeart/2005/8/layout/hierarchy4"/>
     <dgm:cxn modelId="{DC63D3ED-31C9-4221-BE55-78BE35D46E47}" type="presParOf" srcId="{F21BA205-310C-42E7-B5E0-2C5189480B02}" destId="{68FB357F-4A5B-4A7A-B5FD-6CC794129803}" srcOrd="1" destOrd="0" presId="urn:microsoft.com/office/officeart/2005/8/layout/hierarchy4"/>
@@ -8890,25 +8892,25 @@
     </dgm:pt>
   </dgm:ptLst>
   <dgm:cxnLst>
+    <dgm:cxn modelId="{9D24A32B-8DC9-46D3-A42C-34E0428B681F}" type="presOf" srcId="{0A62A2D2-2C68-4160-ABAD-6D27E952343A}" destId="{CDB32B99-34EF-4BB9-B24C-83A8F8CD547A}" srcOrd="0" destOrd="0" presId="urn:microsoft.com/office/officeart/2005/8/layout/hierarchy4"/>
+    <dgm:cxn modelId="{34BA71EC-6458-4B62-9A49-C377FC30999F}" type="presOf" srcId="{74491842-E00F-4583-B12F-1B1D6B36D109}" destId="{D818B6D9-FAA2-496D-B78C-22D2B03C2AFB}" srcOrd="0" destOrd="0" presId="urn:microsoft.com/office/officeart/2005/8/layout/hierarchy4"/>
+    <dgm:cxn modelId="{4975BFCF-74FB-4124-8457-7871F1FCA6EF}" srcId="{0A62A2D2-2C68-4160-ABAD-6D27E952343A}" destId="{C60D5758-00C3-4746-A617-FF46493E9EDD}" srcOrd="0" destOrd="0" parTransId="{48DB7401-C4C4-41E3-8D26-736AF916FE13}" sibTransId="{FEDAD44C-D3D1-4C46-9D9B-808BFEC7CD5F}"/>
+    <dgm:cxn modelId="{338BB73B-9D58-4DD5-B3C6-192F34912787}" type="presOf" srcId="{BADA98C9-C6C5-4BA0-AACB-C96224DC85B8}" destId="{2C9F7DE9-8967-4E67-AF88-B5944B425068}" srcOrd="0" destOrd="0" presId="urn:microsoft.com/office/officeart/2005/8/layout/hierarchy4"/>
+    <dgm:cxn modelId="{3C52AEF0-92E2-4512-B7E8-3E00CD1C910E}" type="presOf" srcId="{89D21CD8-7BFA-485E-8130-8DD0836F5F64}" destId="{3B3A6269-3535-42DF-BA97-F99FE5A6A445}" srcOrd="0" destOrd="0" presId="urn:microsoft.com/office/officeart/2005/8/layout/hierarchy4"/>
+    <dgm:cxn modelId="{64169066-F6B4-40C9-BB4F-CDF5A3ACFB09}" type="presOf" srcId="{C60D5758-00C3-4746-A617-FF46493E9EDD}" destId="{98BDFE83-4B5F-468C-8484-FB1895872045}" srcOrd="0" destOrd="0" presId="urn:microsoft.com/office/officeart/2005/8/layout/hierarchy4"/>
+    <dgm:cxn modelId="{15A3C65F-97D5-4AA6-A36E-2E5B288695A9}" type="presOf" srcId="{C5FAF08E-12E1-4EEB-975C-D08BAA891F50}" destId="{8A6199F2-F1DB-4146-970C-9EBFF04B7FED}" srcOrd="0" destOrd="0" presId="urn:microsoft.com/office/officeart/2005/8/layout/hierarchy4"/>
+    <dgm:cxn modelId="{74ECB6A8-EE60-4491-87CC-1EC2C3049C64}" srcId="{C60D5758-00C3-4746-A617-FF46493E9EDD}" destId="{74491842-E00F-4583-B12F-1B1D6B36D109}" srcOrd="6" destOrd="0" parTransId="{53DD2106-876B-4B35-B799-611348256BBF}" sibTransId="{AB07B637-A3A2-4C27-AA26-2CDF7F6B5E9F}"/>
+    <dgm:cxn modelId="{F51973FB-DA7B-47B6-A182-430100BCE217}" type="presOf" srcId="{586F1ADE-C9C6-4AB5-BADC-A9CC01A03786}" destId="{8498E32E-2AD0-4451-86A6-4DC2D6F7D6A0}" srcOrd="0" destOrd="0" presId="urn:microsoft.com/office/officeart/2005/8/layout/hierarchy4"/>
+    <dgm:cxn modelId="{1710F7A5-1965-40C4-A0F3-2F89786584D2}" srcId="{C60D5758-00C3-4746-A617-FF46493E9EDD}" destId="{89D21CD8-7BFA-485E-8130-8DD0836F5F64}" srcOrd="7" destOrd="0" parTransId="{FD20DF20-3E39-4404-AC64-B30C5B1DE0BC}" sibTransId="{FCD9E418-4054-4447-9573-D43C62815787}"/>
+    <dgm:cxn modelId="{87D0E14C-4EB3-450D-82C3-14852314B8EC}" type="presOf" srcId="{0F62DDD0-B0E5-4E77-BA8B-67C4EB1FCD6B}" destId="{FC021332-E035-4C7B-BDF2-8E4FCA1A9380}" srcOrd="0" destOrd="0" presId="urn:microsoft.com/office/officeart/2005/8/layout/hierarchy4"/>
+    <dgm:cxn modelId="{560F8B63-FC32-4231-A824-45A802EC2C38}" srcId="{C60D5758-00C3-4746-A617-FF46493E9EDD}" destId="{586F1ADE-C9C6-4AB5-BADC-A9CC01A03786}" srcOrd="5" destOrd="0" parTransId="{6A743BC4-EACB-46E4-AD32-E201089783CD}" sibTransId="{5A5A11FD-61CC-422E-8E6E-D4F805FEC423}"/>
     <dgm:cxn modelId="{94BE4E1A-D39F-46E6-8B14-0B06FED7A139}" type="presOf" srcId="{9AF08940-8F50-42E3-8DD1-817CF3E8FD90}" destId="{E5992A07-26E4-4819-860A-49810989A2A2}" srcOrd="0" destOrd="0" presId="urn:microsoft.com/office/officeart/2005/8/layout/hierarchy4"/>
-    <dgm:cxn modelId="{4975BFCF-74FB-4124-8457-7871F1FCA6EF}" srcId="{0A62A2D2-2C68-4160-ABAD-6D27E952343A}" destId="{C60D5758-00C3-4746-A617-FF46493E9EDD}" srcOrd="0" destOrd="0" parTransId="{48DB7401-C4C4-41E3-8D26-736AF916FE13}" sibTransId="{FEDAD44C-D3D1-4C46-9D9B-808BFEC7CD5F}"/>
     <dgm:cxn modelId="{3F980A2C-CE99-445A-AF9C-75F2503C35AE}" type="presOf" srcId="{C440D376-663A-432F-9437-1B0008E907F1}" destId="{099B7531-33CC-4255-9EF9-0181C377F7EB}" srcOrd="0" destOrd="0" presId="urn:microsoft.com/office/officeart/2005/8/layout/hierarchy4"/>
     <dgm:cxn modelId="{598F9C60-6DDA-47D6-97E4-1D850096BD4B}" srcId="{C60D5758-00C3-4746-A617-FF46493E9EDD}" destId="{C5FAF08E-12E1-4EEB-975C-D08BAA891F50}" srcOrd="4" destOrd="0" parTransId="{F0A6CEF4-789E-4560-8520-9C56C64D5570}" sibTransId="{C0783238-4617-43D4-8268-DF00E4371B0D}"/>
-    <dgm:cxn modelId="{9D24A32B-8DC9-46D3-A42C-34E0428B681F}" type="presOf" srcId="{0A62A2D2-2C68-4160-ABAD-6D27E952343A}" destId="{CDB32B99-34EF-4BB9-B24C-83A8F8CD547A}" srcOrd="0" destOrd="0" presId="urn:microsoft.com/office/officeart/2005/8/layout/hierarchy4"/>
     <dgm:cxn modelId="{F3646EAC-966D-435F-B473-D5C4EA812C34}" srcId="{C60D5758-00C3-4746-A617-FF46493E9EDD}" destId="{C440D376-663A-432F-9437-1B0008E907F1}" srcOrd="3" destOrd="0" parTransId="{8981B875-5D0B-4419-8656-4F73F48A3C91}" sibTransId="{E53D378A-A5CB-410F-91DD-C706FE4B66DE}"/>
-    <dgm:cxn modelId="{1710F7A5-1965-40C4-A0F3-2F89786584D2}" srcId="{C60D5758-00C3-4746-A617-FF46493E9EDD}" destId="{89D21CD8-7BFA-485E-8130-8DD0836F5F64}" srcOrd="7" destOrd="0" parTransId="{FD20DF20-3E39-4404-AC64-B30C5B1DE0BC}" sibTransId="{FCD9E418-4054-4447-9573-D43C62815787}"/>
     <dgm:cxn modelId="{C29C3342-FB37-4A1E-B0DF-A5EF81EF5684}" srcId="{C60D5758-00C3-4746-A617-FF46493E9EDD}" destId="{0F62DDD0-B0E5-4E77-BA8B-67C4EB1FCD6B}" srcOrd="2" destOrd="0" parTransId="{B1661716-5D8F-46D2-82A4-0E2335F2B016}" sibTransId="{EE3E0944-D3C5-4A18-BB1E-20D40D9EF803}"/>
-    <dgm:cxn modelId="{87D0E14C-4EB3-450D-82C3-14852314B8EC}" type="presOf" srcId="{0F62DDD0-B0E5-4E77-BA8B-67C4EB1FCD6B}" destId="{FC021332-E035-4C7B-BDF2-8E4FCA1A9380}" srcOrd="0" destOrd="0" presId="urn:microsoft.com/office/officeart/2005/8/layout/hierarchy4"/>
-    <dgm:cxn modelId="{F51973FB-DA7B-47B6-A182-430100BCE217}" type="presOf" srcId="{586F1ADE-C9C6-4AB5-BADC-A9CC01A03786}" destId="{8498E32E-2AD0-4451-86A6-4DC2D6F7D6A0}" srcOrd="0" destOrd="0" presId="urn:microsoft.com/office/officeart/2005/8/layout/hierarchy4"/>
     <dgm:cxn modelId="{ACD09680-D70D-4248-B1CA-E54676D4AEA0}" srcId="{C60D5758-00C3-4746-A617-FF46493E9EDD}" destId="{BADA98C9-C6C5-4BA0-AACB-C96224DC85B8}" srcOrd="1" destOrd="0" parTransId="{7F52105F-190A-417F-A510-B2DA859E04C8}" sibTransId="{7A8CF0B3-7824-4842-9B4D-FFEDCFB812D3}"/>
-    <dgm:cxn modelId="{64169066-F6B4-40C9-BB4F-CDF5A3ACFB09}" type="presOf" srcId="{C60D5758-00C3-4746-A617-FF46493E9EDD}" destId="{98BDFE83-4B5F-468C-8484-FB1895872045}" srcOrd="0" destOrd="0" presId="urn:microsoft.com/office/officeart/2005/8/layout/hierarchy4"/>
-    <dgm:cxn modelId="{74ECB6A8-EE60-4491-87CC-1EC2C3049C64}" srcId="{C60D5758-00C3-4746-A617-FF46493E9EDD}" destId="{74491842-E00F-4583-B12F-1B1D6B36D109}" srcOrd="6" destOrd="0" parTransId="{53DD2106-876B-4B35-B799-611348256BBF}" sibTransId="{AB07B637-A3A2-4C27-AA26-2CDF7F6B5E9F}"/>
     <dgm:cxn modelId="{A035BD28-D95E-4994-BF72-59A2640A712D}" srcId="{C60D5758-00C3-4746-A617-FF46493E9EDD}" destId="{9AF08940-8F50-42E3-8DD1-817CF3E8FD90}" srcOrd="0" destOrd="0" parTransId="{2F4166DE-3361-4625-8DFF-F8764D5BE21D}" sibTransId="{D31CA3CF-BEC2-4733-90FA-55F7596F769C}"/>
-    <dgm:cxn modelId="{34BA71EC-6458-4B62-9A49-C377FC30999F}" type="presOf" srcId="{74491842-E00F-4583-B12F-1B1D6B36D109}" destId="{D818B6D9-FAA2-496D-B78C-22D2B03C2AFB}" srcOrd="0" destOrd="0" presId="urn:microsoft.com/office/officeart/2005/8/layout/hierarchy4"/>
-    <dgm:cxn modelId="{338BB73B-9D58-4DD5-B3C6-192F34912787}" type="presOf" srcId="{BADA98C9-C6C5-4BA0-AACB-C96224DC85B8}" destId="{2C9F7DE9-8967-4E67-AF88-B5944B425068}" srcOrd="0" destOrd="0" presId="urn:microsoft.com/office/officeart/2005/8/layout/hierarchy4"/>
-    <dgm:cxn modelId="{15A3C65F-97D5-4AA6-A36E-2E5B288695A9}" type="presOf" srcId="{C5FAF08E-12E1-4EEB-975C-D08BAA891F50}" destId="{8A6199F2-F1DB-4146-970C-9EBFF04B7FED}" srcOrd="0" destOrd="0" presId="urn:microsoft.com/office/officeart/2005/8/layout/hierarchy4"/>
-    <dgm:cxn modelId="{3C52AEF0-92E2-4512-B7E8-3E00CD1C910E}" type="presOf" srcId="{89D21CD8-7BFA-485E-8130-8DD0836F5F64}" destId="{3B3A6269-3535-42DF-BA97-F99FE5A6A445}" srcOrd="0" destOrd="0" presId="urn:microsoft.com/office/officeart/2005/8/layout/hierarchy4"/>
-    <dgm:cxn modelId="{560F8B63-FC32-4231-A824-45A802EC2C38}" srcId="{C60D5758-00C3-4746-A617-FF46493E9EDD}" destId="{586F1ADE-C9C6-4AB5-BADC-A9CC01A03786}" srcOrd="5" destOrd="0" parTransId="{6A743BC4-EACB-46E4-AD32-E201089783CD}" sibTransId="{5A5A11FD-61CC-422E-8E6E-D4F805FEC423}"/>
     <dgm:cxn modelId="{F71C4AFA-D7E9-474E-83D9-D60260F22C86}" type="presParOf" srcId="{CDB32B99-34EF-4BB9-B24C-83A8F8CD547A}" destId="{F21BA205-310C-42E7-B5E0-2C5189480B02}" srcOrd="0" destOrd="0" presId="urn:microsoft.com/office/officeart/2005/8/layout/hierarchy4"/>
     <dgm:cxn modelId="{A2EF5D19-0A64-414A-B902-ED1186E09A65}" type="presParOf" srcId="{F21BA205-310C-42E7-B5E0-2C5189480B02}" destId="{98BDFE83-4B5F-468C-8484-FB1895872045}" srcOrd="0" destOrd="0" presId="urn:microsoft.com/office/officeart/2005/8/layout/hierarchy4"/>
     <dgm:cxn modelId="{DC63D3ED-31C9-4221-BE55-78BE35D46E47}" type="presParOf" srcId="{F21BA205-310C-42E7-B5E0-2C5189480B02}" destId="{68FB357F-4A5B-4A7A-B5FD-6CC794129803}" srcOrd="1" destOrd="0" presId="urn:microsoft.com/office/officeart/2005/8/layout/hierarchy4"/>
@@ -9780,25 +9782,25 @@
     </dgm:pt>
   </dgm:ptLst>
   <dgm:cxnLst>
+    <dgm:cxn modelId="{9D24A32B-8DC9-46D3-A42C-34E0428B681F}" type="presOf" srcId="{0A62A2D2-2C68-4160-ABAD-6D27E952343A}" destId="{CDB32B99-34EF-4BB9-B24C-83A8F8CD547A}" srcOrd="0" destOrd="0" presId="urn:microsoft.com/office/officeart/2005/8/layout/hierarchy4"/>
+    <dgm:cxn modelId="{34BA71EC-6458-4B62-9A49-C377FC30999F}" type="presOf" srcId="{74491842-E00F-4583-B12F-1B1D6B36D109}" destId="{D818B6D9-FAA2-496D-B78C-22D2B03C2AFB}" srcOrd="0" destOrd="0" presId="urn:microsoft.com/office/officeart/2005/8/layout/hierarchy4"/>
+    <dgm:cxn modelId="{4975BFCF-74FB-4124-8457-7871F1FCA6EF}" srcId="{0A62A2D2-2C68-4160-ABAD-6D27E952343A}" destId="{C60D5758-00C3-4746-A617-FF46493E9EDD}" srcOrd="0" destOrd="0" parTransId="{48DB7401-C4C4-41E3-8D26-736AF916FE13}" sibTransId="{FEDAD44C-D3D1-4C46-9D9B-808BFEC7CD5F}"/>
+    <dgm:cxn modelId="{338BB73B-9D58-4DD5-B3C6-192F34912787}" type="presOf" srcId="{BADA98C9-C6C5-4BA0-AACB-C96224DC85B8}" destId="{2C9F7DE9-8967-4E67-AF88-B5944B425068}" srcOrd="0" destOrd="0" presId="urn:microsoft.com/office/officeart/2005/8/layout/hierarchy4"/>
+    <dgm:cxn modelId="{3C52AEF0-92E2-4512-B7E8-3E00CD1C910E}" type="presOf" srcId="{89D21CD8-7BFA-485E-8130-8DD0836F5F64}" destId="{3B3A6269-3535-42DF-BA97-F99FE5A6A445}" srcOrd="0" destOrd="0" presId="urn:microsoft.com/office/officeart/2005/8/layout/hierarchy4"/>
+    <dgm:cxn modelId="{64169066-F6B4-40C9-BB4F-CDF5A3ACFB09}" type="presOf" srcId="{C60D5758-00C3-4746-A617-FF46493E9EDD}" destId="{98BDFE83-4B5F-468C-8484-FB1895872045}" srcOrd="0" destOrd="0" presId="urn:microsoft.com/office/officeart/2005/8/layout/hierarchy4"/>
+    <dgm:cxn modelId="{15A3C65F-97D5-4AA6-A36E-2E5B288695A9}" type="presOf" srcId="{C5FAF08E-12E1-4EEB-975C-D08BAA891F50}" destId="{8A6199F2-F1DB-4146-970C-9EBFF04B7FED}" srcOrd="0" destOrd="0" presId="urn:microsoft.com/office/officeart/2005/8/layout/hierarchy4"/>
+    <dgm:cxn modelId="{74ECB6A8-EE60-4491-87CC-1EC2C3049C64}" srcId="{C60D5758-00C3-4746-A617-FF46493E9EDD}" destId="{74491842-E00F-4583-B12F-1B1D6B36D109}" srcOrd="6" destOrd="0" parTransId="{53DD2106-876B-4B35-B799-611348256BBF}" sibTransId="{AB07B637-A3A2-4C27-AA26-2CDF7F6B5E9F}"/>
+    <dgm:cxn modelId="{F51973FB-DA7B-47B6-A182-430100BCE217}" type="presOf" srcId="{586F1ADE-C9C6-4AB5-BADC-A9CC01A03786}" destId="{8498E32E-2AD0-4451-86A6-4DC2D6F7D6A0}" srcOrd="0" destOrd="0" presId="urn:microsoft.com/office/officeart/2005/8/layout/hierarchy4"/>
+    <dgm:cxn modelId="{1710F7A5-1965-40C4-A0F3-2F89786584D2}" srcId="{C60D5758-00C3-4746-A617-FF46493E9EDD}" destId="{89D21CD8-7BFA-485E-8130-8DD0836F5F64}" srcOrd="7" destOrd="0" parTransId="{FD20DF20-3E39-4404-AC64-B30C5B1DE0BC}" sibTransId="{FCD9E418-4054-4447-9573-D43C62815787}"/>
+    <dgm:cxn modelId="{87D0E14C-4EB3-450D-82C3-14852314B8EC}" type="presOf" srcId="{0F62DDD0-B0E5-4E77-BA8B-67C4EB1FCD6B}" destId="{FC021332-E035-4C7B-BDF2-8E4FCA1A9380}" srcOrd="0" destOrd="0" presId="urn:microsoft.com/office/officeart/2005/8/layout/hierarchy4"/>
+    <dgm:cxn modelId="{560F8B63-FC32-4231-A824-45A802EC2C38}" srcId="{C60D5758-00C3-4746-A617-FF46493E9EDD}" destId="{586F1ADE-C9C6-4AB5-BADC-A9CC01A03786}" srcOrd="5" destOrd="0" parTransId="{6A743BC4-EACB-46E4-AD32-E201089783CD}" sibTransId="{5A5A11FD-61CC-422E-8E6E-D4F805FEC423}"/>
     <dgm:cxn modelId="{94BE4E1A-D39F-46E6-8B14-0B06FED7A139}" type="presOf" srcId="{9AF08940-8F50-42E3-8DD1-817CF3E8FD90}" destId="{E5992A07-26E4-4819-860A-49810989A2A2}" srcOrd="0" destOrd="0" presId="urn:microsoft.com/office/officeart/2005/8/layout/hierarchy4"/>
-    <dgm:cxn modelId="{4975BFCF-74FB-4124-8457-7871F1FCA6EF}" srcId="{0A62A2D2-2C68-4160-ABAD-6D27E952343A}" destId="{C60D5758-00C3-4746-A617-FF46493E9EDD}" srcOrd="0" destOrd="0" parTransId="{48DB7401-C4C4-41E3-8D26-736AF916FE13}" sibTransId="{FEDAD44C-D3D1-4C46-9D9B-808BFEC7CD5F}"/>
     <dgm:cxn modelId="{3F980A2C-CE99-445A-AF9C-75F2503C35AE}" type="presOf" srcId="{C440D376-663A-432F-9437-1B0008E907F1}" destId="{099B7531-33CC-4255-9EF9-0181C377F7EB}" srcOrd="0" destOrd="0" presId="urn:microsoft.com/office/officeart/2005/8/layout/hierarchy4"/>
     <dgm:cxn modelId="{598F9C60-6DDA-47D6-97E4-1D850096BD4B}" srcId="{C60D5758-00C3-4746-A617-FF46493E9EDD}" destId="{C5FAF08E-12E1-4EEB-975C-D08BAA891F50}" srcOrd="4" destOrd="0" parTransId="{F0A6CEF4-789E-4560-8520-9C56C64D5570}" sibTransId="{C0783238-4617-43D4-8268-DF00E4371B0D}"/>
-    <dgm:cxn modelId="{9D24A32B-8DC9-46D3-A42C-34E0428B681F}" type="presOf" srcId="{0A62A2D2-2C68-4160-ABAD-6D27E952343A}" destId="{CDB32B99-34EF-4BB9-B24C-83A8F8CD547A}" srcOrd="0" destOrd="0" presId="urn:microsoft.com/office/officeart/2005/8/layout/hierarchy4"/>
     <dgm:cxn modelId="{F3646EAC-966D-435F-B473-D5C4EA812C34}" srcId="{C60D5758-00C3-4746-A617-FF46493E9EDD}" destId="{C440D376-663A-432F-9437-1B0008E907F1}" srcOrd="3" destOrd="0" parTransId="{8981B875-5D0B-4419-8656-4F73F48A3C91}" sibTransId="{E53D378A-A5CB-410F-91DD-C706FE4B66DE}"/>
-    <dgm:cxn modelId="{1710F7A5-1965-40C4-A0F3-2F89786584D2}" srcId="{C60D5758-00C3-4746-A617-FF46493E9EDD}" destId="{89D21CD8-7BFA-485E-8130-8DD0836F5F64}" srcOrd="7" destOrd="0" parTransId="{FD20DF20-3E39-4404-AC64-B30C5B1DE0BC}" sibTransId="{FCD9E418-4054-4447-9573-D43C62815787}"/>
     <dgm:cxn modelId="{C29C3342-FB37-4A1E-B0DF-A5EF81EF5684}" srcId="{C60D5758-00C3-4746-A617-FF46493E9EDD}" destId="{0F62DDD0-B0E5-4E77-BA8B-67C4EB1FCD6B}" srcOrd="2" destOrd="0" parTransId="{B1661716-5D8F-46D2-82A4-0E2335F2B016}" sibTransId="{EE3E0944-D3C5-4A18-BB1E-20D40D9EF803}"/>
-    <dgm:cxn modelId="{87D0E14C-4EB3-450D-82C3-14852314B8EC}" type="presOf" srcId="{0F62DDD0-B0E5-4E77-BA8B-67C4EB1FCD6B}" destId="{FC021332-E035-4C7B-BDF2-8E4FCA1A9380}" srcOrd="0" destOrd="0" presId="urn:microsoft.com/office/officeart/2005/8/layout/hierarchy4"/>
-    <dgm:cxn modelId="{F51973FB-DA7B-47B6-A182-430100BCE217}" type="presOf" srcId="{586F1ADE-C9C6-4AB5-BADC-A9CC01A03786}" destId="{8498E32E-2AD0-4451-86A6-4DC2D6F7D6A0}" srcOrd="0" destOrd="0" presId="urn:microsoft.com/office/officeart/2005/8/layout/hierarchy4"/>
     <dgm:cxn modelId="{ACD09680-D70D-4248-B1CA-E54676D4AEA0}" srcId="{C60D5758-00C3-4746-A617-FF46493E9EDD}" destId="{BADA98C9-C6C5-4BA0-AACB-C96224DC85B8}" srcOrd="1" destOrd="0" parTransId="{7F52105F-190A-417F-A510-B2DA859E04C8}" sibTransId="{7A8CF0B3-7824-4842-9B4D-FFEDCFB812D3}"/>
-    <dgm:cxn modelId="{64169066-F6B4-40C9-BB4F-CDF5A3ACFB09}" type="presOf" srcId="{C60D5758-00C3-4746-A617-FF46493E9EDD}" destId="{98BDFE83-4B5F-468C-8484-FB1895872045}" srcOrd="0" destOrd="0" presId="urn:microsoft.com/office/officeart/2005/8/layout/hierarchy4"/>
-    <dgm:cxn modelId="{74ECB6A8-EE60-4491-87CC-1EC2C3049C64}" srcId="{C60D5758-00C3-4746-A617-FF46493E9EDD}" destId="{74491842-E00F-4583-B12F-1B1D6B36D109}" srcOrd="6" destOrd="0" parTransId="{53DD2106-876B-4B35-B799-611348256BBF}" sibTransId="{AB07B637-A3A2-4C27-AA26-2CDF7F6B5E9F}"/>
     <dgm:cxn modelId="{A035BD28-D95E-4994-BF72-59A2640A712D}" srcId="{C60D5758-00C3-4746-A617-FF46493E9EDD}" destId="{9AF08940-8F50-42E3-8DD1-817CF3E8FD90}" srcOrd="0" destOrd="0" parTransId="{2F4166DE-3361-4625-8DFF-F8764D5BE21D}" sibTransId="{D31CA3CF-BEC2-4733-90FA-55F7596F769C}"/>
-    <dgm:cxn modelId="{34BA71EC-6458-4B62-9A49-C377FC30999F}" type="presOf" srcId="{74491842-E00F-4583-B12F-1B1D6B36D109}" destId="{D818B6D9-FAA2-496D-B78C-22D2B03C2AFB}" srcOrd="0" destOrd="0" presId="urn:microsoft.com/office/officeart/2005/8/layout/hierarchy4"/>
-    <dgm:cxn modelId="{338BB73B-9D58-4DD5-B3C6-192F34912787}" type="presOf" srcId="{BADA98C9-C6C5-4BA0-AACB-C96224DC85B8}" destId="{2C9F7DE9-8967-4E67-AF88-B5944B425068}" srcOrd="0" destOrd="0" presId="urn:microsoft.com/office/officeart/2005/8/layout/hierarchy4"/>
-    <dgm:cxn modelId="{15A3C65F-97D5-4AA6-A36E-2E5B288695A9}" type="presOf" srcId="{C5FAF08E-12E1-4EEB-975C-D08BAA891F50}" destId="{8A6199F2-F1DB-4146-970C-9EBFF04B7FED}" srcOrd="0" destOrd="0" presId="urn:microsoft.com/office/officeart/2005/8/layout/hierarchy4"/>
-    <dgm:cxn modelId="{3C52AEF0-92E2-4512-B7E8-3E00CD1C910E}" type="presOf" srcId="{89D21CD8-7BFA-485E-8130-8DD0836F5F64}" destId="{3B3A6269-3535-42DF-BA97-F99FE5A6A445}" srcOrd="0" destOrd="0" presId="urn:microsoft.com/office/officeart/2005/8/layout/hierarchy4"/>
-    <dgm:cxn modelId="{560F8B63-FC32-4231-A824-45A802EC2C38}" srcId="{C60D5758-00C3-4746-A617-FF46493E9EDD}" destId="{586F1ADE-C9C6-4AB5-BADC-A9CC01A03786}" srcOrd="5" destOrd="0" parTransId="{6A743BC4-EACB-46E4-AD32-E201089783CD}" sibTransId="{5A5A11FD-61CC-422E-8E6E-D4F805FEC423}"/>
     <dgm:cxn modelId="{F71C4AFA-D7E9-474E-83D9-D60260F22C86}" type="presParOf" srcId="{CDB32B99-34EF-4BB9-B24C-83A8F8CD547A}" destId="{F21BA205-310C-42E7-B5E0-2C5189480B02}" srcOrd="0" destOrd="0" presId="urn:microsoft.com/office/officeart/2005/8/layout/hierarchy4"/>
     <dgm:cxn modelId="{A2EF5D19-0A64-414A-B902-ED1186E09A65}" type="presParOf" srcId="{F21BA205-310C-42E7-B5E0-2C5189480B02}" destId="{98BDFE83-4B5F-468C-8484-FB1895872045}" srcOrd="0" destOrd="0" presId="urn:microsoft.com/office/officeart/2005/8/layout/hierarchy4"/>
     <dgm:cxn modelId="{DC63D3ED-31C9-4221-BE55-78BE35D46E47}" type="presParOf" srcId="{F21BA205-310C-42E7-B5E0-2C5189480B02}" destId="{68FB357F-4A5B-4A7A-B5FD-6CC794129803}" srcOrd="1" destOrd="0" presId="urn:microsoft.com/office/officeart/2005/8/layout/hierarchy4"/>
@@ -23472,7 +23474,7 @@
               <a:pPr>
                 <a:defRPr/>
               </a:pPr>
-              <a:t>16/09/2021</a:t>
+              <a:t>28/09/2021</a:t>
             </a:fld>
             <a:endParaRPr lang="en-GB" dirty="0"/>
           </a:p>
@@ -23691,7 +23693,7 @@
               <a:pPr>
                 <a:defRPr/>
               </a:pPr>
-              <a:t>16/09/2021</a:t>
+              <a:t>28/09/2021</a:t>
             </a:fld>
             <a:endParaRPr lang="en-GB"/>
           </a:p>
@@ -25210,7 +25212,187 @@
     </p:spTree>
     <p:extLst>
       <p:ext uri="{BB962C8B-B14F-4D97-AF65-F5344CB8AC3E}">
+        <p14:creationId xmlns:p14="http://schemas.microsoft.com/office/powerpoint/2010/main" val="2681763012"/>
+      </p:ext>
+    </p:extLst>
+  </p:cSld>
+  <p:clrMapOvr>
+    <a:masterClrMapping/>
+  </p:clrMapOvr>
+</p:notes>
+</file>
+
+<file path=ppt/notesSlides/notesSlide21.xml><?xml version="1.0" encoding="utf-8"?>
+<p:notes xmlns:a="http://schemas.openxmlformats.org/drawingml/2006/main" xmlns:r="http://schemas.openxmlformats.org/officeDocument/2006/relationships" xmlns:p="http://schemas.openxmlformats.org/presentationml/2006/main">
+  <p:cSld>
+    <p:spTree>
+      <p:nvGrpSpPr>
+        <p:cNvPr id="1" name=""/>
+        <p:cNvGrpSpPr/>
+        <p:nvPr/>
+      </p:nvGrpSpPr>
+      <p:grpSpPr>
+        <a:xfrm>
+          <a:off x="0" y="0"/>
+          <a:ext cx="0" cy="0"/>
+          <a:chOff x="0" y="0"/>
+          <a:chExt cx="0" cy="0"/>
+        </a:xfrm>
+      </p:grpSpPr>
+      <p:sp>
+        <p:nvSpPr>
+          <p:cNvPr id="2" name="Folienbildplatzhalter 1"/>
+          <p:cNvSpPr>
+            <a:spLocks noGrp="1" noRot="1" noChangeAspect="1"/>
+          </p:cNvSpPr>
+          <p:nvPr>
+            <p:ph type="sldImg"/>
+          </p:nvPr>
+        </p:nvSpPr>
+        <p:spPr/>
+      </p:sp>
+      <p:sp>
+        <p:nvSpPr>
+          <p:cNvPr id="3" name="Notizenplatzhalter 2"/>
+          <p:cNvSpPr>
+            <a:spLocks noGrp="1"/>
+          </p:cNvSpPr>
+          <p:nvPr>
+            <p:ph type="body" idx="1"/>
+          </p:nvPr>
+        </p:nvSpPr>
+        <p:spPr/>
+        <p:txBody>
+          <a:bodyPr/>
+          <a:lstStyle/>
+          <a:p>
+            <a:endParaRPr lang="en-US" baseline="0" dirty="0" smtClean="0"/>
+          </a:p>
+        </p:txBody>
+      </p:sp>
+      <p:sp>
+        <p:nvSpPr>
+          <p:cNvPr id="4" name="Foliennummernplatzhalter 3"/>
+          <p:cNvSpPr>
+            <a:spLocks noGrp="1"/>
+          </p:cNvSpPr>
+          <p:nvPr>
+            <p:ph type="sldNum" sz="quarter" idx="10"/>
+          </p:nvPr>
+        </p:nvSpPr>
+        <p:spPr/>
+        <p:txBody>
+          <a:bodyPr/>
+          <a:lstStyle/>
+          <a:p>
+            <a:pPr>
+              <a:defRPr/>
+            </a:pPr>
+            <a:fld id="{00AFC6D0-44D5-4EB7-828F-6F464F83D79A}" type="slidenum">
+              <a:rPr lang="en-GB" smtClean="0"/>
+              <a:pPr>
+                <a:defRPr/>
+              </a:pPr>
+              <a:t>21</a:t>
+            </a:fld>
+            <a:endParaRPr lang="en-GB"/>
+          </a:p>
+        </p:txBody>
+      </p:sp>
+    </p:spTree>
+    <p:extLst>
+      <p:ext uri="{BB962C8B-B14F-4D97-AF65-F5344CB8AC3E}">
         <p14:creationId xmlns:p14="http://schemas.microsoft.com/office/powerpoint/2010/main" val="3900402452"/>
+      </p:ext>
+    </p:extLst>
+  </p:cSld>
+  <p:clrMapOvr>
+    <a:masterClrMapping/>
+  </p:clrMapOvr>
+</p:notes>
+</file>
+
+<file path=ppt/notesSlides/notesSlide22.xml><?xml version="1.0" encoding="utf-8"?>
+<p:notes xmlns:a="http://schemas.openxmlformats.org/drawingml/2006/main" xmlns:r="http://schemas.openxmlformats.org/officeDocument/2006/relationships" xmlns:p="http://schemas.openxmlformats.org/presentationml/2006/main">
+  <p:cSld>
+    <p:spTree>
+      <p:nvGrpSpPr>
+        <p:cNvPr id="1" name=""/>
+        <p:cNvGrpSpPr/>
+        <p:nvPr/>
+      </p:nvGrpSpPr>
+      <p:grpSpPr>
+        <a:xfrm>
+          <a:off x="0" y="0"/>
+          <a:ext cx="0" cy="0"/>
+          <a:chOff x="0" y="0"/>
+          <a:chExt cx="0" cy="0"/>
+        </a:xfrm>
+      </p:grpSpPr>
+      <p:sp>
+        <p:nvSpPr>
+          <p:cNvPr id="2" name="Folienbildplatzhalter 1"/>
+          <p:cNvSpPr>
+            <a:spLocks noGrp="1" noRot="1" noChangeAspect="1"/>
+          </p:cNvSpPr>
+          <p:nvPr>
+            <p:ph type="sldImg"/>
+          </p:nvPr>
+        </p:nvSpPr>
+        <p:spPr/>
+      </p:sp>
+      <p:sp>
+        <p:nvSpPr>
+          <p:cNvPr id="3" name="Notizenplatzhalter 2"/>
+          <p:cNvSpPr>
+            <a:spLocks noGrp="1"/>
+          </p:cNvSpPr>
+          <p:nvPr>
+            <p:ph type="body" idx="1"/>
+          </p:nvPr>
+        </p:nvSpPr>
+        <p:spPr/>
+        <p:txBody>
+          <a:bodyPr/>
+          <a:lstStyle/>
+          <a:p>
+            <a:endParaRPr lang="en-US" baseline="0" dirty="0" smtClean="0"/>
+          </a:p>
+        </p:txBody>
+      </p:sp>
+      <p:sp>
+        <p:nvSpPr>
+          <p:cNvPr id="4" name="Foliennummernplatzhalter 3"/>
+          <p:cNvSpPr>
+            <a:spLocks noGrp="1"/>
+          </p:cNvSpPr>
+          <p:nvPr>
+            <p:ph type="sldNum" sz="quarter" idx="10"/>
+          </p:nvPr>
+        </p:nvSpPr>
+        <p:spPr/>
+        <p:txBody>
+          <a:bodyPr/>
+          <a:lstStyle/>
+          <a:p>
+            <a:pPr>
+              <a:defRPr/>
+            </a:pPr>
+            <a:fld id="{00AFC6D0-44D5-4EB7-828F-6F464F83D79A}" type="slidenum">
+              <a:rPr lang="en-GB" smtClean="0"/>
+              <a:pPr>
+                <a:defRPr/>
+              </a:pPr>
+              <a:t>22</a:t>
+            </a:fld>
+            <a:endParaRPr lang="en-GB"/>
+          </a:p>
+        </p:txBody>
+      </p:sp>
+    </p:spTree>
+    <p:extLst>
+      <p:ext uri="{BB962C8B-B14F-4D97-AF65-F5344CB8AC3E}">
+        <p14:creationId xmlns:p14="http://schemas.microsoft.com/office/powerpoint/2010/main" val="3739819793"/>
       </p:ext>
     </p:extLst>
   </p:cSld>
@@ -36843,11 +37025,7 @@
             </a:r>
             <a:r>
               <a:rPr lang="en-US" sz="2000" dirty="0" smtClean="0"/>
-              <a:t> </a:t>
-            </a:r>
-            <a:r>
-              <a:rPr lang="en-US" sz="2000" dirty="0" smtClean="0"/>
-              <a:t>Notebook: </a:t>
+              <a:t> Notebook: </a:t>
             </a:r>
           </a:p>
           <a:p>
@@ -37093,7 +37271,7 @@
           <a:p>
             <a:pPr marL="285750" indent="-285750">
               <a:lnSpc>
-                <a:spcPct val="150000"/>
+                <a:spcPct val="200000"/>
               </a:lnSpc>
               <a:buFont typeface="Arial" panose="020B0604020202020204" pitchFamily="34" charset="0"/>
               <a:buChar char="•"/>
@@ -37120,7 +37298,20 @@
           <a:p>
             <a:pPr marL="461963" lvl="1" indent="-285750">
               <a:lnSpc>
-                <a:spcPct val="150000"/>
+                <a:spcPct val="200000"/>
+              </a:lnSpc>
+              <a:buFont typeface="Courier New" panose="02070309020205020404" pitchFamily="49" charset="0"/>
+              <a:buChar char="o"/>
+            </a:pPr>
+            <a:r>
+              <a:rPr lang="en-US" sz="1800" dirty="0" smtClean="0"/>
+              <a:t>Understand how the learning rate can affect the training</a:t>
+            </a:r>
+          </a:p>
+          <a:p>
+            <a:pPr marL="461963" lvl="1" indent="-285750">
+              <a:lnSpc>
+                <a:spcPct val="200000"/>
               </a:lnSpc>
               <a:buFont typeface="Courier New" panose="02070309020205020404" pitchFamily="49" charset="0"/>
               <a:buChar char="o"/>
@@ -37131,152 +37322,36 @@
             </a:r>
             <a:r>
               <a:rPr lang="en-US" sz="1800" dirty="0" smtClean="0"/>
-              <a:t>which learning rate would be the best to work with our dataset</a:t>
-            </a:r>
-            <a:endParaRPr lang="en-US" sz="1800" dirty="0"/>
-          </a:p>
-          <a:p>
-            <a:pPr marL="285750" indent="-285750">
-              <a:lnSpc>
-                <a:spcPct val="150000"/>
-              </a:lnSpc>
-              <a:buFont typeface="Arial" panose="020B0604020202020204" pitchFamily="34" charset="0"/>
-              <a:buChar char="•"/>
-            </a:pPr>
-            <a:endParaRPr lang="en-US" sz="2200" dirty="0" smtClean="0"/>
-          </a:p>
-          <a:p>
-            <a:pPr marL="285750" indent="-285750">
-              <a:lnSpc>
-                <a:spcPct val="150000"/>
-              </a:lnSpc>
-              <a:buFont typeface="Arial" panose="020B0604020202020204" pitchFamily="34" charset="0"/>
-              <a:buChar char="•"/>
-            </a:pPr>
-            <a:r>
-              <a:rPr lang="en-US" sz="2000" b="1" dirty="0" smtClean="0"/>
-              <a:t>B Loss Function </a:t>
-            </a:r>
-            <a:r>
-              <a:rPr lang="en-US" sz="2000" b="1" dirty="0" smtClean="0">
-                <a:sym typeface="Wingdings" panose="05000000000000000000" pitchFamily="2" charset="2"/>
-              </a:rPr>
-              <a:t> </a:t>
-            </a:r>
-            <a:r>
-              <a:rPr lang="en-US" sz="2000" b="1" dirty="0" smtClean="0">
-                <a:sym typeface="Wingdings" panose="05000000000000000000" pitchFamily="2" charset="2"/>
-                <a:hlinkClick r:id="rId4"/>
-              </a:rPr>
-              <a:t>Notebook</a:t>
-            </a:r>
-            <a:endParaRPr lang="en-US" sz="2000" b="1" dirty="0"/>
-          </a:p>
-          <a:p>
-            <a:pPr marL="461963" lvl="1" indent="-285750">
-              <a:lnSpc>
-                <a:spcPct val="150000"/>
-              </a:lnSpc>
-              <a:buFont typeface="Courier New" panose="02070309020205020404" pitchFamily="49" charset="0"/>
-              <a:buChar char="o"/>
-            </a:pPr>
-            <a:r>
-              <a:rPr lang="en-US" sz="1800" dirty="0"/>
-              <a:t>Try different loss </a:t>
+              <a:t>which learning rate would be the best to work with our </a:t>
             </a:r>
             <a:r>
               <a:rPr lang="en-US" sz="1800" dirty="0" smtClean="0"/>
-              <a:t>functions</a:t>
+              <a:t>dataset</a:t>
             </a:r>
           </a:p>
           <a:p>
             <a:pPr marL="461963" lvl="1" indent="-285750">
               <a:lnSpc>
-                <a:spcPct val="150000"/>
+                <a:spcPct val="200000"/>
               </a:lnSpc>
               <a:buFont typeface="Courier New" panose="02070309020205020404" pitchFamily="49" charset="0"/>
               <a:buChar char="o"/>
             </a:pPr>
             <a:r>
               <a:rPr lang="en-US" sz="1800" dirty="0" smtClean="0"/>
-              <a:t>check </a:t>
+              <a:t>Take a look at the loss curves to see the impact</a:t>
             </a:r>
-            <a:r>
-              <a:rPr lang="en-US" sz="1800" dirty="0"/>
-              <a:t>which would be the best to use for our </a:t>
-            </a:r>
-            <a:r>
-              <a:rPr lang="en-US" sz="1800" dirty="0" smtClean="0"/>
-              <a:t>model</a:t>
-            </a:r>
+            <a:endParaRPr lang="en-US" sz="2200" dirty="0"/>
           </a:p>
           <a:p>
             <a:pPr marL="461963" lvl="1" indent="-285750">
               <a:lnSpc>
-                <a:spcPct val="150000"/>
+                <a:spcPct val="200000"/>
               </a:lnSpc>
               <a:buFont typeface="Courier New" panose="02070309020205020404" pitchFamily="49" charset="0"/>
               <a:buChar char="o"/>
             </a:pPr>
-            <a:r>
-              <a:rPr lang="en-US" sz="1800" dirty="0" smtClean="0"/>
-              <a:t>Example: </a:t>
-            </a:r>
-            <a:r>
-              <a:rPr lang="en-US" sz="1800" dirty="0" err="1"/>
-              <a:t>mae</a:t>
-            </a:r>
-            <a:r>
-              <a:rPr lang="en-US" sz="1800" dirty="0"/>
-              <a:t>, </a:t>
-            </a:r>
-            <a:r>
-              <a:rPr lang="en-US" sz="1800" dirty="0" err="1" smtClean="0"/>
-              <a:t>mse</a:t>
-            </a:r>
-            <a:r>
-              <a:rPr lang="en-US" sz="1800" dirty="0" smtClean="0"/>
-              <a:t>, </a:t>
-            </a:r>
-            <a:r>
-              <a:rPr lang="en-US" sz="1800" dirty="0" smtClean="0"/>
-              <a:t>map</a:t>
-            </a:r>
-            <a:r>
-              <a:rPr lang="en-US" sz="1800" dirty="0" smtClean="0">
-                <a:sym typeface="Wingdings" panose="05000000000000000000" pitchFamily="2" charset="2"/>
-              </a:rPr>
-              <a:t> </a:t>
-            </a:r>
-            <a:r>
-              <a:rPr lang="en-US" sz="1800" dirty="0" smtClean="0">
-                <a:sym typeface="Wingdings" panose="05000000000000000000" pitchFamily="2" charset="2"/>
-              </a:rPr>
-              <a:t>check </a:t>
-            </a:r>
-            <a:r>
-              <a:rPr lang="en-US" sz="1800" dirty="0" err="1" smtClean="0">
-                <a:sym typeface="Wingdings" panose="05000000000000000000" pitchFamily="2" charset="2"/>
-                <a:hlinkClick r:id="rId5"/>
-              </a:rPr>
-              <a:t>tf.keras</a:t>
-            </a:r>
-            <a:r>
-              <a:rPr lang="en-US" sz="1800" dirty="0" smtClean="0">
-                <a:sym typeface="Wingdings" panose="05000000000000000000" pitchFamily="2" charset="2"/>
-                <a:hlinkClick r:id="rId5"/>
-              </a:rPr>
-              <a:t> documentation</a:t>
-            </a:r>
             <a:endParaRPr lang="en-US" sz="1800" dirty="0"/>
-          </a:p>
-          <a:p>
-            <a:pPr>
-              <a:lnSpc>
-                <a:spcPct val="150000"/>
-              </a:lnSpc>
-            </a:pPr>
-            <a:endParaRPr lang="en-US" sz="2200" dirty="0" smtClean="0"/>
           </a:p>
         </p:txBody>
       </p:sp>
@@ -37358,7 +37433,7 @@
           <p:nvPr/>
         </p:nvPicPr>
         <p:blipFill>
-          <a:blip r:embed="rId6">
+          <a:blip r:embed="rId4">
             <a:duotone>
               <a:schemeClr val="bg2">
                 <a:shade val="45000"/>
@@ -37807,14 +37882,18 @@
           <a:p>
             <a:pPr marL="285750" indent="-285750">
               <a:lnSpc>
-                <a:spcPct val="150000"/>
+                <a:spcPct val="200000"/>
               </a:lnSpc>
               <a:buFont typeface="Arial" panose="020B0604020202020204" pitchFamily="34" charset="0"/>
               <a:buChar char="•"/>
             </a:pPr>
             <a:r>
               <a:rPr lang="en-US" sz="2000" b="1" dirty="0" smtClean="0"/>
-              <a:t>C. Model Architecture </a:t>
+              <a:t>B </a:t>
+            </a:r>
+            <a:r>
+              <a:rPr lang="en-US" sz="2000" b="1" dirty="0" smtClean="0"/>
+              <a:t>Loss Function </a:t>
             </a:r>
             <a:r>
               <a:rPr lang="en-US" sz="2000" b="1" dirty="0" smtClean="0">
@@ -37834,208 +37913,129 @@
           <a:p>
             <a:pPr marL="461963" lvl="1" indent="-285750">
               <a:lnSpc>
-                <a:spcPct val="150000"/>
+                <a:spcPct val="200000"/>
               </a:lnSpc>
               <a:buFont typeface="Courier New" panose="02070309020205020404" pitchFamily="49" charset="0"/>
               <a:buChar char="o"/>
             </a:pPr>
             <a:r>
               <a:rPr lang="en-US" sz="1800" dirty="0"/>
-              <a:t>Change </a:t>
+              <a:t>Try different loss </a:t>
             </a:r>
             <a:r>
               <a:rPr lang="en-US" sz="1800" dirty="0" smtClean="0"/>
-              <a:t>model architecture </a:t>
-            </a:r>
-            <a:r>
-              <a:rPr lang="en-US" sz="1800" dirty="0"/>
-              <a:t>(embedding </a:t>
-            </a:r>
-            <a:r>
-              <a:rPr lang="en-US" sz="1800" dirty="0" smtClean="0"/>
-              <a:t>output dimensionality and </a:t>
-            </a:r>
-            <a:r>
-              <a:rPr lang="en-US" sz="1800" dirty="0"/>
-              <a:t>encoder layer type) </a:t>
+              <a:t>functions</a:t>
             </a:r>
           </a:p>
           <a:p>
             <a:pPr marL="461963" lvl="1" indent="-285750">
               <a:lnSpc>
-                <a:spcPct val="150000"/>
+                <a:spcPct val="200000"/>
               </a:lnSpc>
               <a:buFont typeface="Courier New" panose="02070309020205020404" pitchFamily="49" charset="0"/>
               <a:buChar char="o"/>
             </a:pPr>
             <a:r>
               <a:rPr lang="en-US" sz="1800" dirty="0" smtClean="0"/>
-              <a:t>explore </a:t>
+              <a:t>check </a:t>
             </a:r>
             <a:r>
               <a:rPr lang="en-US" sz="1800" dirty="0"/>
-              <a:t>how this would change the model </a:t>
+              <a:t>which would be the best to use for our </a:t>
             </a:r>
             <a:r>
               <a:rPr lang="en-US" sz="1800" dirty="0" smtClean="0"/>
-              <a:t>performance</a:t>
+              <a:t>model</a:t>
             </a:r>
           </a:p>
           <a:p>
             <a:pPr marL="461963" lvl="1" indent="-285750">
               <a:lnSpc>
-                <a:spcPct val="150000"/>
+                <a:spcPct val="200000"/>
               </a:lnSpc>
               <a:buFont typeface="Courier New" panose="02070309020205020404" pitchFamily="49" charset="0"/>
               <a:buChar char="o"/>
             </a:pPr>
             <a:r>
               <a:rPr lang="en-US" sz="1800" dirty="0" smtClean="0"/>
-              <a:t>Note: change </a:t>
+              <a:t>Example: </a:t>
+            </a:r>
+            <a:r>
+              <a:rPr lang="en-US" sz="1800" dirty="0" err="1"/>
+              <a:t>mae</a:t>
             </a:r>
             <a:r>
               <a:rPr lang="en-US" sz="1800" dirty="0"/>
-              <a:t>one thing at time to see </a:t>
+              <a:t>, </a:t>
             </a:r>
             <a:r>
-              <a:rPr lang="en-US" sz="1800" dirty="0" smtClean="0"/>
-              <a:t>how it will </a:t>
+              <a:rPr lang="en-US" sz="1800" dirty="0" err="1" smtClean="0"/>
+              <a:t>mse</a:t>
             </a:r>
             <a:r>
               <a:rPr lang="en-US" sz="1800" dirty="0"/>
-              <a:t>affect the </a:t>
+              <a:t> </a:t>
             </a:r>
             <a:r>
-              <a:rPr lang="en-US" sz="1800" dirty="0" smtClean="0"/>
-              <a:t>model</a:t>
-            </a:r>
-            <a:r>
-              <a:rPr lang="en-US" sz="2200" dirty="0"/>
-              <a:t/>
-            </a:r>
-            <a:br>
-              <a:rPr lang="en-US" sz="2200" dirty="0"/>
-            </a:br>
-            <a:endParaRPr lang="en-US" sz="2200" dirty="0"/>
-          </a:p>
-          <a:p>
-            <a:pPr marL="285750" indent="-285750">
-              <a:lnSpc>
-                <a:spcPct val="150000"/>
-              </a:lnSpc>
-              <a:buFont typeface="Arial" panose="020B0604020202020204" pitchFamily="34" charset="0"/>
-              <a:buChar char="•"/>
-            </a:pPr>
-            <a:r>
-              <a:rPr lang="en-US" sz="2000" b="1" dirty="0" smtClean="0"/>
-              <a:t>D. Train Test Split </a:t>
-            </a:r>
-            <a:r>
-              <a:rPr lang="en-US" sz="2000" b="1" dirty="0" smtClean="0">
+              <a:rPr lang="en-US" sz="1800" dirty="0" smtClean="0">
                 <a:sym typeface="Wingdings" panose="05000000000000000000" pitchFamily="2" charset="2"/>
               </a:rPr>
               <a:t> </a:t>
             </a:r>
             <a:r>
-              <a:rPr lang="en-US" sz="2000" b="1" dirty="0" smtClean="0">
+              <a:rPr lang="en-US" sz="1800" dirty="0" smtClean="0">
+                <a:sym typeface="Wingdings" panose="05000000000000000000" pitchFamily="2" charset="2"/>
+              </a:rPr>
+              <a:t>check </a:t>
+            </a:r>
+            <a:r>
+              <a:rPr lang="en-US" sz="1800" dirty="0" err="1" smtClean="0">
                 <a:sym typeface="Wingdings" panose="05000000000000000000" pitchFamily="2" charset="2"/>
                 <a:hlinkClick r:id="rId4"/>
               </a:rPr>
-              <a:t>Notebook</a:t>
+              <a:t>tf.keras</a:t>
             </a:r>
-            <a:endParaRPr lang="en-US" sz="2000" b="1" dirty="0"/>
+            <a:r>
+              <a:rPr lang="en-US" sz="1800" dirty="0" smtClean="0">
+                <a:sym typeface="Wingdings" panose="05000000000000000000" pitchFamily="2" charset="2"/>
+                <a:hlinkClick r:id="rId4"/>
+              </a:rPr>
+              <a:t> </a:t>
+            </a:r>
+            <a:r>
+              <a:rPr lang="en-US" sz="1800" dirty="0" smtClean="0">
+                <a:sym typeface="Wingdings" panose="05000000000000000000" pitchFamily="2" charset="2"/>
+                <a:hlinkClick r:id="rId4"/>
+              </a:rPr>
+              <a:t>documentation</a:t>
+            </a:r>
+            <a:endParaRPr lang="en-US" sz="1800" dirty="0" smtClean="0">
+              <a:sym typeface="Wingdings" panose="05000000000000000000" pitchFamily="2" charset="2"/>
+            </a:endParaRPr>
           </a:p>
           <a:p>
             <a:pPr marL="461963" lvl="1" indent="-285750">
               <a:lnSpc>
-                <a:spcPct val="150000"/>
+                <a:spcPct val="200000"/>
               </a:lnSpc>
               <a:buFont typeface="Courier New" panose="02070309020205020404" pitchFamily="49" charset="0"/>
               <a:buChar char="o"/>
             </a:pPr>
             <a:r>
-              <a:rPr lang="en-US" sz="1800" dirty="0"/>
-              <a:t>Use different train test splits where </a:t>
+              <a:rPr lang="en-US" sz="1800" dirty="0" smtClean="0">
+                <a:sym typeface="Wingdings" panose="05000000000000000000" pitchFamily="2" charset="2"/>
+              </a:rPr>
+              <a:t>Look at the histogram of residuals and see if you can spot a difference</a:t>
             </a:r>
-            <a:r>
-              <a:rPr lang="en-US" sz="1800" dirty="0" smtClean="0"/>
-              <a:t>we omitted </a:t>
-            </a:r>
-            <a:r>
-              <a:rPr lang="en-US" sz="1800" dirty="0"/>
-              <a:t>certain </a:t>
-            </a:r>
-            <a:r>
-              <a:rPr lang="en-US" sz="1800" dirty="0" smtClean="0"/>
-              <a:t>types </a:t>
-            </a:r>
-            <a:r>
-              <a:rPr lang="en-US" sz="1800" dirty="0"/>
-              <a:t>of data from training </a:t>
-            </a:r>
-            <a:r>
-              <a:rPr lang="en-US" sz="1800" dirty="0" smtClean="0"/>
-              <a:t>dataset</a:t>
-            </a:r>
-          </a:p>
-          <a:p>
-            <a:pPr marL="461963" lvl="1" indent="-285750">
-              <a:lnSpc>
-                <a:spcPct val="150000"/>
-              </a:lnSpc>
-              <a:buFont typeface="Courier New" panose="02070309020205020404" pitchFamily="49" charset="0"/>
-              <a:buChar char="o"/>
-            </a:pPr>
-            <a:r>
-              <a:rPr lang="en-US" sz="1800" dirty="0" smtClean="0"/>
-              <a:t>see </a:t>
-            </a:r>
-            <a:r>
-              <a:rPr lang="en-US" sz="1800" dirty="0"/>
-              <a:t>how that </a:t>
-            </a:r>
-            <a:r>
-              <a:rPr lang="en-US" sz="1800" dirty="0" smtClean="0"/>
-              <a:t>affects </a:t>
-            </a:r>
-            <a:r>
-              <a:rPr lang="en-US" sz="1800" dirty="0"/>
-              <a:t>the predictions </a:t>
-            </a:r>
-            <a:r>
-              <a:rPr lang="en-US" sz="1800" dirty="0" smtClean="0"/>
-              <a:t>on the </a:t>
-            </a:r>
-            <a:r>
-              <a:rPr lang="en-US" sz="1800" dirty="0"/>
-              <a:t>test </a:t>
-            </a:r>
-            <a:r>
-              <a:rPr lang="en-US" sz="1800" dirty="0" smtClean="0"/>
-              <a:t>dataset</a:t>
-            </a:r>
-          </a:p>
-          <a:p>
-            <a:pPr marL="461963" lvl="1" indent="-285750">
-              <a:lnSpc>
-                <a:spcPct val="150000"/>
-              </a:lnSpc>
-              <a:buFont typeface="Courier New" panose="02070309020205020404" pitchFamily="49" charset="0"/>
-              <a:buChar char="o"/>
-            </a:pPr>
-            <a:r>
-              <a:rPr lang="en-US" sz="1800" dirty="0" smtClean="0"/>
-              <a:t>What was omitted?</a:t>
-            </a:r>
-            <a:endParaRPr lang="en-US" sz="2200" dirty="0" smtClean="0"/>
+            <a:endParaRPr lang="en-US" sz="1800" dirty="0"/>
           </a:p>
           <a:p>
             <a:pPr>
               <a:lnSpc>
-                <a:spcPct val="150000"/>
+                <a:spcPct val="200000"/>
               </a:lnSpc>
             </a:pPr>
-            <a:endParaRPr lang="en-US" sz="2200" dirty="0"/>
+            <a:endParaRPr lang="en-US" sz="2200" dirty="0" smtClean="0"/>
           </a:p>
         </p:txBody>
       </p:sp>
@@ -38153,6 +38153,290 @@
     </p:spTree>
     <p:extLst>
       <p:ext uri="{BB962C8B-B14F-4D97-AF65-F5344CB8AC3E}">
+        <p14:creationId xmlns:p14="http://schemas.microsoft.com/office/powerpoint/2010/main" val="2455585500"/>
+      </p:ext>
+    </p:extLst>
+  </p:cSld>
+  <p:clrMapOvr>
+    <a:masterClrMapping/>
+  </p:clrMapOvr>
+  <p:timing>
+    <p:tnLst>
+      <p:par>
+        <p:cTn id="1" dur="indefinite" restart="never" nodeType="tmRoot"/>
+      </p:par>
+    </p:tnLst>
+  </p:timing>
+</p:sld>
+</file>
+
+<file path=ppt/slides/slide21.xml><?xml version="1.0" encoding="utf-8"?>
+<p:sld xmlns:a="http://schemas.openxmlformats.org/drawingml/2006/main" xmlns:r="http://schemas.openxmlformats.org/officeDocument/2006/relationships" xmlns:p="http://schemas.openxmlformats.org/presentationml/2006/main">
+  <p:cSld>
+    <p:spTree>
+      <p:nvGrpSpPr>
+        <p:cNvPr id="1" name=""/>
+        <p:cNvGrpSpPr/>
+        <p:nvPr/>
+      </p:nvGrpSpPr>
+      <p:grpSpPr>
+        <a:xfrm>
+          <a:off x="0" y="0"/>
+          <a:ext cx="0" cy="0"/>
+          <a:chOff x="0" y="0"/>
+          <a:chExt cx="0" cy="0"/>
+        </a:xfrm>
+      </p:grpSpPr>
+      <p:sp>
+        <p:nvSpPr>
+          <p:cNvPr id="2" name="Inhaltsplatzhalter 1"/>
+          <p:cNvSpPr>
+            <a:spLocks noGrp="1"/>
+          </p:cNvSpPr>
+          <p:nvPr>
+            <p:ph idx="1"/>
+          </p:nvPr>
+        </p:nvSpPr>
+        <p:spPr/>
+        <p:txBody>
+          <a:bodyPr/>
+          <a:lstStyle/>
+          <a:p>
+            <a:pPr marL="285750" indent="-285750">
+              <a:lnSpc>
+                <a:spcPct val="200000"/>
+              </a:lnSpc>
+              <a:buFont typeface="Arial" panose="020B0604020202020204" pitchFamily="34" charset="0"/>
+              <a:buChar char="•"/>
+            </a:pPr>
+            <a:r>
+              <a:rPr lang="en-US" sz="2000" b="1" dirty="0" smtClean="0"/>
+              <a:t>C. Model Architecture </a:t>
+            </a:r>
+            <a:r>
+              <a:rPr lang="en-US" sz="2000" b="1" dirty="0" smtClean="0">
+                <a:sym typeface="Wingdings" panose="05000000000000000000" pitchFamily="2" charset="2"/>
+              </a:rPr>
+              <a:t> </a:t>
+            </a:r>
+            <a:r>
+              <a:rPr lang="en-US" sz="2000" b="1" dirty="0" smtClean="0">
+                <a:sym typeface="Wingdings" panose="05000000000000000000" pitchFamily="2" charset="2"/>
+                <a:hlinkClick r:id="rId3"/>
+              </a:rPr>
+              <a:t>Notebook</a:t>
+            </a:r>
+            <a:endParaRPr lang="en-US" sz="2000" b="1" dirty="0"/>
+          </a:p>
+          <a:p>
+            <a:pPr marL="461963" lvl="1" indent="-285750">
+              <a:lnSpc>
+                <a:spcPct val="200000"/>
+              </a:lnSpc>
+              <a:buFont typeface="Courier New" panose="02070309020205020404" pitchFamily="49" charset="0"/>
+              <a:buChar char="o"/>
+            </a:pPr>
+            <a:r>
+              <a:rPr lang="en-US" sz="1800" dirty="0"/>
+              <a:t>Change </a:t>
+            </a:r>
+            <a:r>
+              <a:rPr lang="en-US" sz="1800" dirty="0" smtClean="0"/>
+              <a:t>model architecture </a:t>
+            </a:r>
+            <a:r>
+              <a:rPr lang="en-US" sz="1800" dirty="0"/>
+              <a:t>(embedding </a:t>
+            </a:r>
+            <a:r>
+              <a:rPr lang="en-US" sz="1800" dirty="0" smtClean="0"/>
+              <a:t>output dimensionality and </a:t>
+            </a:r>
+            <a:r>
+              <a:rPr lang="en-US" sz="1800" dirty="0"/>
+              <a:t>encoder layer type) </a:t>
+            </a:r>
+          </a:p>
+          <a:p>
+            <a:pPr marL="461963" lvl="1" indent="-285750">
+              <a:lnSpc>
+                <a:spcPct val="200000"/>
+              </a:lnSpc>
+              <a:buFont typeface="Courier New" panose="02070309020205020404" pitchFamily="49" charset="0"/>
+              <a:buChar char="o"/>
+            </a:pPr>
+            <a:r>
+              <a:rPr lang="en-US" sz="1800" dirty="0" smtClean="0"/>
+              <a:t>explore </a:t>
+            </a:r>
+            <a:r>
+              <a:rPr lang="en-US" sz="1800" dirty="0"/>
+              <a:t>how this would change the model </a:t>
+            </a:r>
+            <a:r>
+              <a:rPr lang="en-US" sz="1800" dirty="0" smtClean="0"/>
+              <a:t>performance</a:t>
+            </a:r>
+          </a:p>
+          <a:p>
+            <a:pPr marL="461963" lvl="1" indent="-285750">
+              <a:lnSpc>
+                <a:spcPct val="200000"/>
+              </a:lnSpc>
+              <a:buFont typeface="Courier New" panose="02070309020205020404" pitchFamily="49" charset="0"/>
+              <a:buChar char="o"/>
+            </a:pPr>
+            <a:r>
+              <a:rPr lang="en-US" sz="1800" dirty="0" smtClean="0"/>
+              <a:t>Note: change </a:t>
+            </a:r>
+            <a:r>
+              <a:rPr lang="en-US" sz="1800" dirty="0"/>
+              <a:t>one thing at time to see </a:t>
+            </a:r>
+            <a:r>
+              <a:rPr lang="en-US" sz="1800" dirty="0" smtClean="0"/>
+              <a:t>how it will </a:t>
+            </a:r>
+            <a:r>
+              <a:rPr lang="en-US" sz="1800" dirty="0"/>
+              <a:t>affect the </a:t>
+            </a:r>
+            <a:r>
+              <a:rPr lang="en-US" sz="1800" dirty="0" smtClean="0"/>
+              <a:t>model</a:t>
+            </a:r>
+          </a:p>
+          <a:p>
+            <a:pPr marL="461963" lvl="1" indent="-285750">
+              <a:lnSpc>
+                <a:spcPct val="200000"/>
+              </a:lnSpc>
+              <a:buFont typeface="Courier New" panose="02070309020205020404" pitchFamily="49" charset="0"/>
+              <a:buChar char="o"/>
+            </a:pPr>
+            <a:r>
+              <a:rPr lang="en-US" sz="1800" dirty="0" smtClean="0"/>
+              <a:t>Check the time delta plots and the histogram of residuals to see which model architecture performs better</a:t>
+            </a:r>
+            <a:endParaRPr lang="en-US" sz="2200" dirty="0"/>
+          </a:p>
+        </p:txBody>
+      </p:sp>
+      <p:sp>
+        <p:nvSpPr>
+          <p:cNvPr id="3" name="Foliennummernplatzhalter 2"/>
+          <p:cNvSpPr>
+            <a:spLocks noGrp="1"/>
+          </p:cNvSpPr>
+          <p:nvPr>
+            <p:ph type="sldNum" sz="quarter" idx="11"/>
+          </p:nvPr>
+        </p:nvSpPr>
+        <p:spPr/>
+        <p:txBody>
+          <a:bodyPr/>
+          <a:lstStyle/>
+          <a:p>
+            <a:fld id="{CE58CB1E-F828-4F11-99E0-327109AF9DA4}" type="slidenum">
+              <a:rPr lang="de-DE" smtClean="0"/>
+              <a:pPr/>
+              <a:t>21</a:t>
+            </a:fld>
+            <a:endParaRPr lang="de-DE" dirty="0"/>
+          </a:p>
+        </p:txBody>
+      </p:sp>
+      <p:sp>
+        <p:nvSpPr>
+          <p:cNvPr id="4" name="Fußzeilenplatzhalter 3"/>
+          <p:cNvSpPr>
+            <a:spLocks noGrp="1"/>
+          </p:cNvSpPr>
+          <p:nvPr>
+            <p:ph type="ftr" sz="quarter" idx="12"/>
+          </p:nvPr>
+        </p:nvSpPr>
+        <p:spPr/>
+        <p:txBody>
+          <a:bodyPr/>
+          <a:lstStyle/>
+          <a:p>
+            <a:r>
+              <a:rPr lang="en-US" dirty="0" smtClean="0"/>
+              <a:t>Prof. Dr. Mathias Wilhelm (TUM) | Wilhelm Group | Computational Mass Spectrometry</a:t>
+            </a:r>
+          </a:p>
+        </p:txBody>
+      </p:sp>
+      <p:sp>
+        <p:nvSpPr>
+          <p:cNvPr id="5" name="Titel 4"/>
+          <p:cNvSpPr>
+            <a:spLocks noGrp="1"/>
+          </p:cNvSpPr>
+          <p:nvPr>
+            <p:ph type="title"/>
+          </p:nvPr>
+        </p:nvSpPr>
+        <p:spPr/>
+        <p:txBody>
+          <a:bodyPr/>
+          <a:lstStyle/>
+          <a:p>
+            <a:r>
+              <a:rPr lang="en-US" dirty="0" smtClean="0"/>
+              <a:t>	Task</a:t>
+            </a:r>
+            <a:endParaRPr lang="en-US" dirty="0"/>
+          </a:p>
+        </p:txBody>
+      </p:sp>
+      <p:pic>
+        <p:nvPicPr>
+          <p:cNvPr id="7" name="Grafik 6"/>
+          <p:cNvPicPr>
+            <a:picLocks noChangeAspect="1"/>
+          </p:cNvPicPr>
+          <p:nvPr/>
+        </p:nvPicPr>
+        <p:blipFill>
+          <a:blip r:embed="rId4">
+            <a:duotone>
+              <a:schemeClr val="bg2">
+                <a:shade val="45000"/>
+                <a:satMod val="135000"/>
+              </a:schemeClr>
+              <a:prstClr val="white"/>
+            </a:duotone>
+            <a:extLst>
+              <a:ext uri="{28A0092B-C50C-407E-A947-70E740481C1C}">
+                <a14:useLocalDpi xmlns:a14="http://schemas.microsoft.com/office/drawing/2010/main" val="0"/>
+              </a:ext>
+            </a:extLst>
+          </a:blip>
+          <a:stretch>
+            <a:fillRect/>
+          </a:stretch>
+        </p:blipFill>
+        <p:spPr>
+          <a:xfrm>
+            <a:off x="311161" y="859215"/>
+            <a:ext cx="680605" cy="680605"/>
+          </a:xfrm>
+          <a:prstGeom prst="rect">
+            <a:avLst/>
+          </a:prstGeom>
+          <a:solidFill>
+            <a:srgbClr val="64A0C8">
+              <a:alpha val="10000"/>
+            </a:srgbClr>
+          </a:solidFill>
+        </p:spPr>
+      </p:pic>
+    </p:spTree>
+    <p:extLst>
+      <p:ext uri="{BB962C8B-B14F-4D97-AF65-F5344CB8AC3E}">
         <p14:creationId xmlns:p14="http://schemas.microsoft.com/office/powerpoint/2010/main" val="641333550"/>
       </p:ext>
     </p:extLst>
@@ -38170,7 +38454,295 @@
 </p:sld>
 </file>
 
-<file path=ppt/slides/slide21.xml><?xml version="1.0" encoding="utf-8"?>
+<file path=ppt/slides/slide22.xml><?xml version="1.0" encoding="utf-8"?>
+<p:sld xmlns:a="http://schemas.openxmlformats.org/drawingml/2006/main" xmlns:r="http://schemas.openxmlformats.org/officeDocument/2006/relationships" xmlns:p="http://schemas.openxmlformats.org/presentationml/2006/main">
+  <p:cSld>
+    <p:spTree>
+      <p:nvGrpSpPr>
+        <p:cNvPr id="1" name=""/>
+        <p:cNvGrpSpPr/>
+        <p:nvPr/>
+      </p:nvGrpSpPr>
+      <p:grpSpPr>
+        <a:xfrm>
+          <a:off x="0" y="0"/>
+          <a:ext cx="0" cy="0"/>
+          <a:chOff x="0" y="0"/>
+          <a:chExt cx="0" cy="0"/>
+        </a:xfrm>
+      </p:grpSpPr>
+      <p:sp>
+        <p:nvSpPr>
+          <p:cNvPr id="2" name="Inhaltsplatzhalter 1"/>
+          <p:cNvSpPr>
+            <a:spLocks noGrp="1"/>
+          </p:cNvSpPr>
+          <p:nvPr>
+            <p:ph idx="1"/>
+          </p:nvPr>
+        </p:nvSpPr>
+        <p:spPr/>
+        <p:txBody>
+          <a:bodyPr/>
+          <a:lstStyle/>
+          <a:p>
+            <a:pPr marL="285750" indent="-285750">
+              <a:lnSpc>
+                <a:spcPct val="200000"/>
+              </a:lnSpc>
+              <a:buFont typeface="Arial" panose="020B0604020202020204" pitchFamily="34" charset="0"/>
+              <a:buChar char="•"/>
+            </a:pPr>
+            <a:r>
+              <a:rPr lang="en-US" sz="2000" b="1" dirty="0" smtClean="0"/>
+              <a:t>D</a:t>
+            </a:r>
+            <a:r>
+              <a:rPr lang="en-US" sz="2000" b="1" dirty="0" smtClean="0"/>
+              <a:t>. Train Test Split </a:t>
+            </a:r>
+            <a:r>
+              <a:rPr lang="en-US" sz="2000" b="1" dirty="0" smtClean="0">
+                <a:sym typeface="Wingdings" panose="05000000000000000000" pitchFamily="2" charset="2"/>
+              </a:rPr>
+              <a:t> </a:t>
+            </a:r>
+            <a:r>
+              <a:rPr lang="en-US" sz="2000" b="1" dirty="0" smtClean="0">
+                <a:sym typeface="Wingdings" panose="05000000000000000000" pitchFamily="2" charset="2"/>
+                <a:hlinkClick r:id="rId3"/>
+              </a:rPr>
+              <a:t>Notebook</a:t>
+            </a:r>
+            <a:endParaRPr lang="en-US" sz="2000" b="1" dirty="0"/>
+          </a:p>
+          <a:p>
+            <a:pPr marL="461963" lvl="1" indent="-285750">
+              <a:lnSpc>
+                <a:spcPct val="200000"/>
+              </a:lnSpc>
+              <a:buFont typeface="Courier New" panose="02070309020205020404" pitchFamily="49" charset="0"/>
+              <a:buChar char="o"/>
+            </a:pPr>
+            <a:r>
+              <a:rPr lang="en-US" sz="1800" dirty="0"/>
+              <a:t>Use different train test splits where </a:t>
+            </a:r>
+            <a:r>
+              <a:rPr lang="en-US" sz="1800" dirty="0" smtClean="0"/>
+              <a:t>we omitted </a:t>
+            </a:r>
+            <a:r>
+              <a:rPr lang="en-US" sz="1800" dirty="0"/>
+              <a:t>certain </a:t>
+            </a:r>
+            <a:r>
+              <a:rPr lang="en-US" sz="1800" dirty="0" smtClean="0"/>
+              <a:t>types </a:t>
+            </a:r>
+            <a:r>
+              <a:rPr lang="en-US" sz="1800" dirty="0"/>
+              <a:t>of data from training </a:t>
+            </a:r>
+            <a:r>
+              <a:rPr lang="en-US" sz="1800" dirty="0" smtClean="0"/>
+              <a:t>dataset</a:t>
+            </a:r>
+          </a:p>
+          <a:p>
+            <a:pPr marL="461963" lvl="1" indent="-285750">
+              <a:lnSpc>
+                <a:spcPct val="200000"/>
+              </a:lnSpc>
+              <a:buFont typeface="Courier New" panose="02070309020205020404" pitchFamily="49" charset="0"/>
+              <a:buChar char="o"/>
+            </a:pPr>
+            <a:r>
+              <a:rPr lang="en-US" sz="1800" dirty="0" smtClean="0"/>
+              <a:t>See </a:t>
+            </a:r>
+            <a:r>
+              <a:rPr lang="en-US" sz="1800" dirty="0"/>
+              <a:t>how that </a:t>
+            </a:r>
+            <a:r>
+              <a:rPr lang="en-US" sz="1800" dirty="0" smtClean="0"/>
+              <a:t>affects </a:t>
+            </a:r>
+            <a:r>
+              <a:rPr lang="en-US" sz="1800" dirty="0"/>
+              <a:t>the predictions </a:t>
+            </a:r>
+            <a:r>
+              <a:rPr lang="en-US" sz="1800" dirty="0" smtClean="0"/>
+              <a:t>on the </a:t>
+            </a:r>
+            <a:r>
+              <a:rPr lang="en-US" sz="1800" dirty="0"/>
+              <a:t>test </a:t>
+            </a:r>
+            <a:r>
+              <a:rPr lang="en-US" sz="1800" dirty="0" smtClean="0"/>
+              <a:t>dataset and how this would affect our judgement on the model performance</a:t>
+            </a:r>
+            <a:endParaRPr lang="en-US" sz="1800" dirty="0" smtClean="0"/>
+          </a:p>
+          <a:p>
+            <a:pPr marL="461963" lvl="1" indent="-285750">
+              <a:lnSpc>
+                <a:spcPct val="200000"/>
+              </a:lnSpc>
+              <a:buFont typeface="Courier New" panose="02070309020205020404" pitchFamily="49" charset="0"/>
+              <a:buChar char="o"/>
+            </a:pPr>
+            <a:r>
+              <a:rPr lang="en-US" sz="1800" dirty="0" smtClean="0"/>
+              <a:t>What was omitted?</a:t>
+            </a:r>
+            <a:endParaRPr lang="en-US" sz="2200" dirty="0" smtClean="0"/>
+          </a:p>
+          <a:p>
+            <a:pPr>
+              <a:lnSpc>
+                <a:spcPct val="200000"/>
+              </a:lnSpc>
+            </a:pPr>
+            <a:endParaRPr lang="en-US" sz="2200" dirty="0"/>
+          </a:p>
+        </p:txBody>
+      </p:sp>
+      <p:sp>
+        <p:nvSpPr>
+          <p:cNvPr id="3" name="Foliennummernplatzhalter 2"/>
+          <p:cNvSpPr>
+            <a:spLocks noGrp="1"/>
+          </p:cNvSpPr>
+          <p:nvPr>
+            <p:ph type="sldNum" sz="quarter" idx="11"/>
+          </p:nvPr>
+        </p:nvSpPr>
+        <p:spPr/>
+        <p:txBody>
+          <a:bodyPr/>
+          <a:lstStyle/>
+          <a:p>
+            <a:fld id="{CE58CB1E-F828-4F11-99E0-327109AF9DA4}" type="slidenum">
+              <a:rPr lang="de-DE" smtClean="0"/>
+              <a:pPr/>
+              <a:t>22</a:t>
+            </a:fld>
+            <a:endParaRPr lang="de-DE" dirty="0"/>
+          </a:p>
+        </p:txBody>
+      </p:sp>
+      <p:sp>
+        <p:nvSpPr>
+          <p:cNvPr id="4" name="Fußzeilenplatzhalter 3"/>
+          <p:cNvSpPr>
+            <a:spLocks noGrp="1"/>
+          </p:cNvSpPr>
+          <p:nvPr>
+            <p:ph type="ftr" sz="quarter" idx="12"/>
+          </p:nvPr>
+        </p:nvSpPr>
+        <p:spPr/>
+        <p:txBody>
+          <a:bodyPr/>
+          <a:lstStyle/>
+          <a:p>
+            <a:r>
+              <a:rPr lang="en-US" dirty="0" smtClean="0"/>
+              <a:t>Prof. Dr. Mathias Wilhelm (TUM) | Wilhelm Group | Computational Mass Spectrometry</a:t>
+            </a:r>
+          </a:p>
+        </p:txBody>
+      </p:sp>
+      <p:sp>
+        <p:nvSpPr>
+          <p:cNvPr id="5" name="Titel 4"/>
+          <p:cNvSpPr>
+            <a:spLocks noGrp="1"/>
+          </p:cNvSpPr>
+          <p:nvPr>
+            <p:ph type="title"/>
+          </p:nvPr>
+        </p:nvSpPr>
+        <p:spPr/>
+        <p:txBody>
+          <a:bodyPr/>
+          <a:lstStyle/>
+          <a:p>
+            <a:r>
+              <a:rPr lang="en-US" dirty="0" smtClean="0"/>
+              <a:t>	Task</a:t>
+            </a:r>
+            <a:endParaRPr lang="en-US" dirty="0"/>
+          </a:p>
+        </p:txBody>
+      </p:sp>
+      <p:pic>
+        <p:nvPicPr>
+          <p:cNvPr id="7" name="Grafik 6"/>
+          <p:cNvPicPr>
+            <a:picLocks noChangeAspect="1"/>
+          </p:cNvPicPr>
+          <p:nvPr/>
+        </p:nvPicPr>
+        <p:blipFill>
+          <a:blip r:embed="rId4">
+            <a:duotone>
+              <a:schemeClr val="bg2">
+                <a:shade val="45000"/>
+                <a:satMod val="135000"/>
+              </a:schemeClr>
+              <a:prstClr val="white"/>
+            </a:duotone>
+            <a:extLst>
+              <a:ext uri="{28A0092B-C50C-407E-A947-70E740481C1C}">
+                <a14:useLocalDpi xmlns:a14="http://schemas.microsoft.com/office/drawing/2010/main" val="0"/>
+              </a:ext>
+            </a:extLst>
+          </a:blip>
+          <a:stretch>
+            <a:fillRect/>
+          </a:stretch>
+        </p:blipFill>
+        <p:spPr>
+          <a:xfrm>
+            <a:off x="311161" y="859215"/>
+            <a:ext cx="680605" cy="680605"/>
+          </a:xfrm>
+          <a:prstGeom prst="rect">
+            <a:avLst/>
+          </a:prstGeom>
+          <a:solidFill>
+            <a:srgbClr val="64A0C8">
+              <a:alpha val="10000"/>
+            </a:srgbClr>
+          </a:solidFill>
+        </p:spPr>
+      </p:pic>
+    </p:spTree>
+    <p:extLst>
+      <p:ext uri="{BB962C8B-B14F-4D97-AF65-F5344CB8AC3E}">
+        <p14:creationId xmlns:p14="http://schemas.microsoft.com/office/powerpoint/2010/main" val="227134732"/>
+      </p:ext>
+    </p:extLst>
+  </p:cSld>
+  <p:clrMapOvr>
+    <a:masterClrMapping/>
+  </p:clrMapOvr>
+  <p:timing>
+    <p:tnLst>
+      <p:par>
+        <p:cTn id="1" dur="indefinite" restart="never" nodeType="tmRoot"/>
+      </p:par>
+    </p:tnLst>
+  </p:timing>
+</p:sld>
+</file>
+
+<file path=ppt/slides/slide23.xml><?xml version="1.0" encoding="utf-8"?>
 <p:sld xmlns:a="http://schemas.openxmlformats.org/drawingml/2006/main" xmlns:r="http://schemas.openxmlformats.org/officeDocument/2006/relationships" xmlns:p="http://schemas.openxmlformats.org/presentationml/2006/main">
   <p:cSld>
     <p:spTree>
@@ -38318,7 +38890,7 @@
             <a:fld id="{CE58CB1E-F828-4F11-99E0-327109AF9DA4}" type="slidenum">
               <a:rPr lang="de-DE" smtClean="0"/>
               <a:pPr/>
-              <a:t>21</a:t>
+              <a:t>23</a:t>
             </a:fld>
             <a:endParaRPr lang="de-DE" dirty="0"/>
           </a:p>
@@ -38390,7 +38962,7 @@
 </p:sld>
 </file>
 
-<file path=ppt/slides/slide22.xml><?xml version="1.0" encoding="utf-8"?>
+<file path=ppt/slides/slide24.xml><?xml version="1.0" encoding="utf-8"?>
 <p:sld xmlns:a="http://schemas.openxmlformats.org/drawingml/2006/main" xmlns:r="http://schemas.openxmlformats.org/officeDocument/2006/relationships" xmlns:p="http://schemas.openxmlformats.org/presentationml/2006/main">
   <p:cSld>
     <p:spTree>
@@ -38666,7 +39238,7 @@
             <a:fld id="{CE58CB1E-F828-4F11-99E0-327109AF9DA4}" type="slidenum">
               <a:rPr lang="de-DE" smtClean="0"/>
               <a:pPr/>
-              <a:t>22</a:t>
+              <a:t>24</a:t>
             </a:fld>
             <a:endParaRPr lang="de-DE" dirty="0"/>
           </a:p>

</xml_diff>